<commit_message>
Update Gradesheet Application(Mac Final) (1).pptx
</commit_message>
<xml_diff>
--- a/C Programming/Gradesheet Application/Gradesheet Application(Mac Final) (1).pptx
+++ b/C Programming/Gradesheet Application/Gradesheet Application(Mac Final) (1).pptx
@@ -21,7 +21,7 @@
   <p:notesSz cx="6858000" cy="9144000"/>
   <p:defaultTextStyle>
     <a:defPPr>
-      <a:defRPr lang="en-NP"/>
+      <a:defRPr lang="x-none"/>
     </a:defPPr>
     <a:lvl1pPr marL="0" algn="l" defTabSz="914400" rtl="0" eaLnBrk="1" latinLnBrk="0" hangingPunct="1">
       <a:defRPr sz="1800" kern="1200">
@@ -179,7 +179,7 @@
             </a:lvl1pPr>
           </a:lstStyle>
           <a:p>
-            <a:endParaRPr lang="en-NP"/>
+            <a:endParaRPr lang="x-none"/>
           </a:p>
         </p:txBody>
       </p:sp>
@@ -211,10 +211,10 @@
           </a:lstStyle>
           <a:p>
             <a:fld id="{3F52E9F2-F0F6-8C4F-AB3D-37879A2D7897}" type="datetimeFigureOut">
-              <a:rPr lang="en-NP" smtClean="0"/>
-              <a:t>06/22/2024</a:t>
+              <a:rPr lang="x-none" smtClean="0"/>
+              <a:t>6/22/2024</a:t>
             </a:fld>
-            <a:endParaRPr lang="en-NP"/>
+            <a:endParaRPr lang="x-none"/>
           </a:p>
         </p:txBody>
       </p:sp>
@@ -247,7 +247,7 @@
           <a:bodyPr vert="horz" lIns="91440" tIns="45720" rIns="91440" bIns="45720" rtlCol="0" anchor="ctr"/>
           <a:lstStyle/>
           <a:p>
-            <a:endParaRPr lang="en-NP"/>
+            <a:endParaRPr lang="x-none"/>
           </a:p>
         </p:txBody>
       </p:sp>
@@ -307,7 +307,7 @@
               <a:rPr lang="en-US"/>
               <a:t>Fifth level</a:t>
             </a:r>
-            <a:endParaRPr lang="en-NP"/>
+            <a:endParaRPr lang="x-none"/>
           </a:p>
         </p:txBody>
       </p:sp>
@@ -338,7 +338,7 @@
             </a:lvl1pPr>
           </a:lstStyle>
           <a:p>
-            <a:endParaRPr lang="en-NP"/>
+            <a:endParaRPr lang="x-none"/>
           </a:p>
         </p:txBody>
       </p:sp>
@@ -370,10 +370,10 @@
           </a:lstStyle>
           <a:p>
             <a:fld id="{883C38C9-9BF9-7D46-AA07-E2142CF54F6D}" type="slidenum">
-              <a:rPr lang="en-NP" smtClean="0"/>
+              <a:rPr lang="x-none" smtClean="0"/>
               <a:t>‹#›</a:t>
             </a:fld>
-            <a:endParaRPr lang="en-NP"/>
+            <a:endParaRPr lang="x-none"/>
           </a:p>
         </p:txBody>
       </p:sp>
@@ -502,7 +502,7 @@
           <p:cNvPr id="2" name="Title 1">
             <a:extLst>
               <a:ext uri="{FF2B5EF4-FFF2-40B4-BE49-F238E27FC236}">
-                <a16:creationId xmlns:a16="http://schemas.microsoft.com/office/drawing/2014/main" id="{E4336E9A-8E96-CD8C-7598-F87632CD81CF}"/>
+                <a16:creationId xmlns:a16="http://schemas.microsoft.com/office/drawing/2014/main" xmlns="" id="{E4336E9A-8E96-CD8C-7598-F87632CD81CF}"/>
               </a:ext>
             </a:extLst>
           </p:cNvPr>
@@ -541,7 +541,7 @@
           <p:cNvPr id="3" name="Subtitle 2">
             <a:extLst>
               <a:ext uri="{FF2B5EF4-FFF2-40B4-BE49-F238E27FC236}">
-                <a16:creationId xmlns:a16="http://schemas.microsoft.com/office/drawing/2014/main" id="{2BDC76B8-60F6-62D3-9F73-E81662203017}"/>
+                <a16:creationId xmlns:a16="http://schemas.microsoft.com/office/drawing/2014/main" xmlns="" id="{2BDC76B8-60F6-62D3-9F73-E81662203017}"/>
               </a:ext>
             </a:extLst>
           </p:cNvPr>
@@ -613,7 +613,7 @@
           <p:cNvPr id="4" name="Date Placeholder 3">
             <a:extLst>
               <a:ext uri="{FF2B5EF4-FFF2-40B4-BE49-F238E27FC236}">
-                <a16:creationId xmlns:a16="http://schemas.microsoft.com/office/drawing/2014/main" id="{EAE2DAFA-435E-AAF9-8B67-495E5AFDCD91}"/>
+                <a16:creationId xmlns:a16="http://schemas.microsoft.com/office/drawing/2014/main" xmlns="" id="{EAE2DAFA-435E-AAF9-8B67-495E5AFDCD91}"/>
               </a:ext>
             </a:extLst>
           </p:cNvPr>
@@ -642,7 +642,7 @@
           <p:cNvPr id="5" name="Footer Placeholder 4">
             <a:extLst>
               <a:ext uri="{FF2B5EF4-FFF2-40B4-BE49-F238E27FC236}">
-                <a16:creationId xmlns:a16="http://schemas.microsoft.com/office/drawing/2014/main" id="{5B407A58-3351-E479-1A0C-2FF49FA42707}"/>
+                <a16:creationId xmlns:a16="http://schemas.microsoft.com/office/drawing/2014/main" xmlns="" id="{5B407A58-3351-E479-1A0C-2FF49FA42707}"/>
               </a:ext>
             </a:extLst>
           </p:cNvPr>
@@ -671,7 +671,7 @@
           <p:cNvPr id="6" name="Slide Number Placeholder 5">
             <a:extLst>
               <a:ext uri="{FF2B5EF4-FFF2-40B4-BE49-F238E27FC236}">
-                <a16:creationId xmlns:a16="http://schemas.microsoft.com/office/drawing/2014/main" id="{81789E10-2433-2ECB-9C92-571B583A4CF1}"/>
+                <a16:creationId xmlns:a16="http://schemas.microsoft.com/office/drawing/2014/main" xmlns="" id="{81789E10-2433-2ECB-9C92-571B583A4CF1}"/>
               </a:ext>
             </a:extLst>
           </p:cNvPr>
@@ -706,7 +706,7 @@
     <a:masterClrMapping/>
   </p:clrMapOvr>
   <mc:AlternateContent xmlns:mc="http://schemas.openxmlformats.org/markup-compatibility/2006">
-    <mc:Choice xmlns:p159="http://schemas.microsoft.com/office/powerpoint/2015/09/main" Requires="p159">
+    <mc:Choice xmlns:p159="http://schemas.microsoft.com/office/powerpoint/2015/09/main" xmlns="" Requires="p159">
       <p:transition xmlns:p14="http://schemas.microsoft.com/office/powerpoint/2010/main" spd="slow" p14:dur="2000">
         <p159:morph option="byObject"/>
       </p:transition>
@@ -758,7 +758,7 @@
           <p:cNvPr id="2" name="Title 1">
             <a:extLst>
               <a:ext uri="{FF2B5EF4-FFF2-40B4-BE49-F238E27FC236}">
-                <a16:creationId xmlns:a16="http://schemas.microsoft.com/office/drawing/2014/main" id="{354E956D-CB73-C986-F100-46487310D11E}"/>
+                <a16:creationId xmlns:a16="http://schemas.microsoft.com/office/drawing/2014/main" xmlns="" id="{354E956D-CB73-C986-F100-46487310D11E}"/>
               </a:ext>
             </a:extLst>
           </p:cNvPr>
@@ -791,7 +791,7 @@
           <p:cNvPr id="3" name="Vertical Text Placeholder 2">
             <a:extLst>
               <a:ext uri="{FF2B5EF4-FFF2-40B4-BE49-F238E27FC236}">
-                <a16:creationId xmlns:a16="http://schemas.microsoft.com/office/drawing/2014/main" id="{FE423E6A-A07C-BF0D-EA30-9A8A854E48F1}"/>
+                <a16:creationId xmlns:a16="http://schemas.microsoft.com/office/drawing/2014/main" xmlns="" id="{FE423E6A-A07C-BF0D-EA30-9A8A854E48F1}"/>
               </a:ext>
             </a:extLst>
           </p:cNvPr>
@@ -853,7 +853,7 @@
           <p:cNvPr id="4" name="Date Placeholder 3">
             <a:extLst>
               <a:ext uri="{FF2B5EF4-FFF2-40B4-BE49-F238E27FC236}">
-                <a16:creationId xmlns:a16="http://schemas.microsoft.com/office/drawing/2014/main" id="{EEDC9908-8F95-8DFC-72CC-158552B56735}"/>
+                <a16:creationId xmlns:a16="http://schemas.microsoft.com/office/drawing/2014/main" xmlns="" id="{EEDC9908-8F95-8DFC-72CC-158552B56735}"/>
               </a:ext>
             </a:extLst>
           </p:cNvPr>
@@ -882,7 +882,7 @@
           <p:cNvPr id="5" name="Footer Placeholder 4">
             <a:extLst>
               <a:ext uri="{FF2B5EF4-FFF2-40B4-BE49-F238E27FC236}">
-                <a16:creationId xmlns:a16="http://schemas.microsoft.com/office/drawing/2014/main" id="{2C26C9BE-9060-50CB-2BB7-07307FF89A7A}"/>
+                <a16:creationId xmlns:a16="http://schemas.microsoft.com/office/drawing/2014/main" xmlns="" id="{2C26C9BE-9060-50CB-2BB7-07307FF89A7A}"/>
               </a:ext>
             </a:extLst>
           </p:cNvPr>
@@ -911,7 +911,7 @@
           <p:cNvPr id="6" name="Slide Number Placeholder 5">
             <a:extLst>
               <a:ext uri="{FF2B5EF4-FFF2-40B4-BE49-F238E27FC236}">
-                <a16:creationId xmlns:a16="http://schemas.microsoft.com/office/drawing/2014/main" id="{A84A835B-97D3-BC22-F0B8-4986D4636271}"/>
+                <a16:creationId xmlns:a16="http://schemas.microsoft.com/office/drawing/2014/main" xmlns="" id="{A84A835B-97D3-BC22-F0B8-4986D4636271}"/>
               </a:ext>
             </a:extLst>
           </p:cNvPr>
@@ -946,7 +946,7 @@
     <a:masterClrMapping/>
   </p:clrMapOvr>
   <mc:AlternateContent xmlns:mc="http://schemas.openxmlformats.org/markup-compatibility/2006">
-    <mc:Choice xmlns:p159="http://schemas.microsoft.com/office/powerpoint/2015/09/main" Requires="p159">
+    <mc:Choice xmlns:p159="http://schemas.microsoft.com/office/powerpoint/2015/09/main" xmlns="" Requires="p159">
       <p:transition xmlns:p14="http://schemas.microsoft.com/office/powerpoint/2010/main" spd="slow" p14:dur="2000">
         <p159:morph option="byObject"/>
       </p:transition>
@@ -982,7 +982,7 @@
           <p:cNvPr id="2" name="Vertical Title 1">
             <a:extLst>
               <a:ext uri="{FF2B5EF4-FFF2-40B4-BE49-F238E27FC236}">
-                <a16:creationId xmlns:a16="http://schemas.microsoft.com/office/drawing/2014/main" id="{485B0252-346C-F6F4-3642-19F571550D45}"/>
+                <a16:creationId xmlns:a16="http://schemas.microsoft.com/office/drawing/2014/main" xmlns="" id="{485B0252-346C-F6F4-3642-19F571550D45}"/>
               </a:ext>
             </a:extLst>
           </p:cNvPr>
@@ -1015,7 +1015,7 @@
           <p:cNvPr id="3" name="Vertical Text Placeholder 2">
             <a:extLst>
               <a:ext uri="{FF2B5EF4-FFF2-40B4-BE49-F238E27FC236}">
-                <a16:creationId xmlns:a16="http://schemas.microsoft.com/office/drawing/2014/main" id="{F798DA36-7351-9D6A-518B-678AB8A507D3}"/>
+                <a16:creationId xmlns:a16="http://schemas.microsoft.com/office/drawing/2014/main" xmlns="" id="{F798DA36-7351-9D6A-518B-678AB8A507D3}"/>
               </a:ext>
             </a:extLst>
           </p:cNvPr>
@@ -1077,7 +1077,7 @@
           <p:cNvPr id="4" name="Date Placeholder 3">
             <a:extLst>
               <a:ext uri="{FF2B5EF4-FFF2-40B4-BE49-F238E27FC236}">
-                <a16:creationId xmlns:a16="http://schemas.microsoft.com/office/drawing/2014/main" id="{8846BDFF-D746-836C-04B8-CA89AD5D1466}"/>
+                <a16:creationId xmlns:a16="http://schemas.microsoft.com/office/drawing/2014/main" xmlns="" id="{8846BDFF-D746-836C-04B8-CA89AD5D1466}"/>
               </a:ext>
             </a:extLst>
           </p:cNvPr>
@@ -1106,7 +1106,7 @@
           <p:cNvPr id="5" name="Footer Placeholder 4">
             <a:extLst>
               <a:ext uri="{FF2B5EF4-FFF2-40B4-BE49-F238E27FC236}">
-                <a16:creationId xmlns:a16="http://schemas.microsoft.com/office/drawing/2014/main" id="{919AA929-A9E6-FF9C-0C59-177F892D6A69}"/>
+                <a16:creationId xmlns:a16="http://schemas.microsoft.com/office/drawing/2014/main" xmlns="" id="{919AA929-A9E6-FF9C-0C59-177F892D6A69}"/>
               </a:ext>
             </a:extLst>
           </p:cNvPr>
@@ -1135,7 +1135,7 @@
           <p:cNvPr id="6" name="Slide Number Placeholder 5">
             <a:extLst>
               <a:ext uri="{FF2B5EF4-FFF2-40B4-BE49-F238E27FC236}">
-                <a16:creationId xmlns:a16="http://schemas.microsoft.com/office/drawing/2014/main" id="{9316D893-7E81-90DC-4139-7687B39C3AC8}"/>
+                <a16:creationId xmlns:a16="http://schemas.microsoft.com/office/drawing/2014/main" xmlns="" id="{9316D893-7E81-90DC-4139-7687B39C3AC8}"/>
               </a:ext>
             </a:extLst>
           </p:cNvPr>
@@ -1170,7 +1170,7 @@
     <a:masterClrMapping/>
   </p:clrMapOvr>
   <mc:AlternateContent xmlns:mc="http://schemas.openxmlformats.org/markup-compatibility/2006">
-    <mc:Choice xmlns:p159="http://schemas.microsoft.com/office/powerpoint/2015/09/main" Requires="p159">
+    <mc:Choice xmlns:p159="http://schemas.microsoft.com/office/powerpoint/2015/09/main" xmlns="" Requires="p159">
       <p:transition xmlns:p14="http://schemas.microsoft.com/office/powerpoint/2010/main" spd="slow" p14:dur="2000">
         <p159:morph option="byObject"/>
       </p:transition>
@@ -1206,7 +1206,7 @@
           <p:cNvPr id="2" name="Title 1">
             <a:extLst>
               <a:ext uri="{FF2B5EF4-FFF2-40B4-BE49-F238E27FC236}">
-                <a16:creationId xmlns:a16="http://schemas.microsoft.com/office/drawing/2014/main" id="{15263A02-4DAC-8C0F-6100-EF61FD02D115}"/>
+                <a16:creationId xmlns:a16="http://schemas.microsoft.com/office/drawing/2014/main" xmlns="" id="{15263A02-4DAC-8C0F-6100-EF61FD02D115}"/>
               </a:ext>
             </a:extLst>
           </p:cNvPr>
@@ -1226,7 +1226,7 @@
               <a:rPr lang="en-US"/>
               <a:t>Click to edit Master title style</a:t>
             </a:r>
-            <a:endParaRPr lang="en-NP"/>
+            <a:endParaRPr lang="x-none"/>
           </a:p>
         </p:txBody>
       </p:sp>
@@ -1235,7 +1235,7 @@
           <p:cNvPr id="3" name="Text Placeholder 2">
             <a:extLst>
               <a:ext uri="{FF2B5EF4-FFF2-40B4-BE49-F238E27FC236}">
-                <a16:creationId xmlns:a16="http://schemas.microsoft.com/office/drawing/2014/main" id="{52E2C033-A02A-3CEF-11E3-3D5068475EB5}"/>
+                <a16:creationId xmlns:a16="http://schemas.microsoft.com/office/drawing/2014/main" xmlns="" id="{52E2C033-A02A-3CEF-11E3-3D5068475EB5}"/>
               </a:ext>
             </a:extLst>
           </p:cNvPr>
@@ -1284,7 +1284,7 @@
               <a:rPr lang="en-US"/>
               <a:t>Fifth level</a:t>
             </a:r>
-            <a:endParaRPr lang="en-NP"/>
+            <a:endParaRPr lang="x-none"/>
           </a:p>
         </p:txBody>
       </p:sp>
@@ -1293,7 +1293,7 @@
           <p:cNvPr id="4" name="Date Placeholder 3">
             <a:extLst>
               <a:ext uri="{FF2B5EF4-FFF2-40B4-BE49-F238E27FC236}">
-                <a16:creationId xmlns:a16="http://schemas.microsoft.com/office/drawing/2014/main" id="{314253E9-5797-7175-7236-96E810558F0C}"/>
+                <a16:creationId xmlns:a16="http://schemas.microsoft.com/office/drawing/2014/main" xmlns="" id="{314253E9-5797-7175-7236-96E810558F0C}"/>
               </a:ext>
             </a:extLst>
           </p:cNvPr>
@@ -1313,7 +1313,7 @@
               <a:rPr lang="en-US" smtClean="0"/>
               <a:t>6/22/2024</a:t>
             </a:fld>
-            <a:endParaRPr lang="en-NP"/>
+            <a:endParaRPr lang="x-none"/>
           </a:p>
         </p:txBody>
       </p:sp>
@@ -1322,7 +1322,7 @@
           <p:cNvPr id="5" name="Footer Placeholder 4">
             <a:extLst>
               <a:ext uri="{FF2B5EF4-FFF2-40B4-BE49-F238E27FC236}">
-                <a16:creationId xmlns:a16="http://schemas.microsoft.com/office/drawing/2014/main" id="{22A0EDBC-EE09-8EDF-E1B2-08E14716FF40}"/>
+                <a16:creationId xmlns:a16="http://schemas.microsoft.com/office/drawing/2014/main" xmlns="" id="{22A0EDBC-EE09-8EDF-E1B2-08E14716FF40}"/>
               </a:ext>
             </a:extLst>
           </p:cNvPr>
@@ -1338,7 +1338,7 @@
           <a:bodyPr/>
           <a:lstStyle/>
           <a:p>
-            <a:endParaRPr lang="en-NP"/>
+            <a:endParaRPr lang="x-none"/>
           </a:p>
         </p:txBody>
       </p:sp>
@@ -1347,7 +1347,7 @@
           <p:cNvPr id="6" name="Slide Number Placeholder 5">
             <a:extLst>
               <a:ext uri="{FF2B5EF4-FFF2-40B4-BE49-F238E27FC236}">
-                <a16:creationId xmlns:a16="http://schemas.microsoft.com/office/drawing/2014/main" id="{566740A3-430E-5EB6-3C79-5956957C6A2D}"/>
+                <a16:creationId xmlns:a16="http://schemas.microsoft.com/office/drawing/2014/main" xmlns="" id="{566740A3-430E-5EB6-3C79-5956957C6A2D}"/>
               </a:ext>
             </a:extLst>
           </p:cNvPr>
@@ -1364,10 +1364,10 @@
           <a:lstStyle/>
           <a:p>
             <a:fld id="{81FEE814-E9C2-BC4F-99F5-ABB679497227}" type="slidenum">
-              <a:rPr lang="en-NP" smtClean="0"/>
+              <a:rPr lang="x-none" smtClean="0"/>
               <a:t>‹#›</a:t>
             </a:fld>
-            <a:endParaRPr lang="en-NP"/>
+            <a:endParaRPr lang="x-none"/>
           </a:p>
         </p:txBody>
       </p:sp>
@@ -1382,7 +1382,7 @@
     <a:masterClrMapping/>
   </p:clrMapOvr>
   <mc:AlternateContent xmlns:mc="http://schemas.openxmlformats.org/markup-compatibility/2006">
-    <mc:Choice xmlns:p159="http://schemas.microsoft.com/office/powerpoint/2015/09/main" Requires="p159">
+    <mc:Choice xmlns:p159="http://schemas.microsoft.com/office/powerpoint/2015/09/main" xmlns="" Requires="p159">
       <p:transition xmlns:p14="http://schemas.microsoft.com/office/powerpoint/2010/main" spd="slow" p14:dur="2000">
         <p159:morph option="byObject"/>
       </p:transition>
@@ -1418,7 +1418,7 @@
           <p:cNvPr id="2" name="Title 1">
             <a:extLst>
               <a:ext uri="{FF2B5EF4-FFF2-40B4-BE49-F238E27FC236}">
-                <a16:creationId xmlns:a16="http://schemas.microsoft.com/office/drawing/2014/main" id="{BC7433D9-FD02-59E2-0F81-A0B7201D2DA0}"/>
+                <a16:creationId xmlns:a16="http://schemas.microsoft.com/office/drawing/2014/main" xmlns="" id="{BC7433D9-FD02-59E2-0F81-A0B7201D2DA0}"/>
               </a:ext>
             </a:extLst>
           </p:cNvPr>
@@ -1446,7 +1446,7 @@
           <p:cNvPr id="3" name="Content Placeholder 2">
             <a:extLst>
               <a:ext uri="{FF2B5EF4-FFF2-40B4-BE49-F238E27FC236}">
-                <a16:creationId xmlns:a16="http://schemas.microsoft.com/office/drawing/2014/main" id="{6C2DD052-3E45-E789-01F8-33250024ECBD}"/>
+                <a16:creationId xmlns:a16="http://schemas.microsoft.com/office/drawing/2014/main" xmlns="" id="{6C2DD052-3E45-E789-01F8-33250024ECBD}"/>
               </a:ext>
             </a:extLst>
           </p:cNvPr>
@@ -1503,7 +1503,7 @@
           <p:cNvPr id="4" name="Date Placeholder 3">
             <a:extLst>
               <a:ext uri="{FF2B5EF4-FFF2-40B4-BE49-F238E27FC236}">
-                <a16:creationId xmlns:a16="http://schemas.microsoft.com/office/drawing/2014/main" id="{0B9485D1-E172-8F0A-A425-3097B3ABCFB4}"/>
+                <a16:creationId xmlns:a16="http://schemas.microsoft.com/office/drawing/2014/main" xmlns="" id="{0B9485D1-E172-8F0A-A425-3097B3ABCFB4}"/>
               </a:ext>
             </a:extLst>
           </p:cNvPr>
@@ -1532,7 +1532,7 @@
           <p:cNvPr id="5" name="Footer Placeholder 4">
             <a:extLst>
               <a:ext uri="{FF2B5EF4-FFF2-40B4-BE49-F238E27FC236}">
-                <a16:creationId xmlns:a16="http://schemas.microsoft.com/office/drawing/2014/main" id="{B17E6B5E-6174-FD5C-41E8-FFC44C650D7E}"/>
+                <a16:creationId xmlns:a16="http://schemas.microsoft.com/office/drawing/2014/main" xmlns="" id="{B17E6B5E-6174-FD5C-41E8-FFC44C650D7E}"/>
               </a:ext>
             </a:extLst>
           </p:cNvPr>
@@ -1561,7 +1561,7 @@
           <p:cNvPr id="6" name="Slide Number Placeholder 5">
             <a:extLst>
               <a:ext uri="{FF2B5EF4-FFF2-40B4-BE49-F238E27FC236}">
-                <a16:creationId xmlns:a16="http://schemas.microsoft.com/office/drawing/2014/main" id="{4BF72154-F85B-E301-DA57-E314D7315916}"/>
+                <a16:creationId xmlns:a16="http://schemas.microsoft.com/office/drawing/2014/main" xmlns="" id="{4BF72154-F85B-E301-DA57-E314D7315916}"/>
               </a:ext>
             </a:extLst>
           </p:cNvPr>
@@ -1596,7 +1596,7 @@
     <a:masterClrMapping/>
   </p:clrMapOvr>
   <mc:AlternateContent xmlns:mc="http://schemas.openxmlformats.org/markup-compatibility/2006">
-    <mc:Choice xmlns:p159="http://schemas.microsoft.com/office/powerpoint/2015/09/main" Requires="p159">
+    <mc:Choice xmlns:p159="http://schemas.microsoft.com/office/powerpoint/2015/09/main" xmlns="" Requires="p159">
       <p:transition xmlns:p14="http://schemas.microsoft.com/office/powerpoint/2010/main" spd="slow" p14:dur="2000">
         <p159:morph option="byObject"/>
       </p:transition>
@@ -1632,7 +1632,7 @@
           <p:cNvPr id="2" name="Title 1">
             <a:extLst>
               <a:ext uri="{FF2B5EF4-FFF2-40B4-BE49-F238E27FC236}">
-                <a16:creationId xmlns:a16="http://schemas.microsoft.com/office/drawing/2014/main" id="{951D06AF-EF87-8489-2C82-DEB90B7EFE0C}"/>
+                <a16:creationId xmlns:a16="http://schemas.microsoft.com/office/drawing/2014/main" xmlns="" id="{951D06AF-EF87-8489-2C82-DEB90B7EFE0C}"/>
               </a:ext>
             </a:extLst>
           </p:cNvPr>
@@ -1671,7 +1671,7 @@
           <p:cNvPr id="3" name="Text Placeholder 2">
             <a:extLst>
               <a:ext uri="{FF2B5EF4-FFF2-40B4-BE49-F238E27FC236}">
-                <a16:creationId xmlns:a16="http://schemas.microsoft.com/office/drawing/2014/main" id="{308E5678-CA38-1318-9EA2-5E0A4F9A59BA}"/>
+                <a16:creationId xmlns:a16="http://schemas.microsoft.com/office/drawing/2014/main" xmlns="" id="{308E5678-CA38-1318-9EA2-5E0A4F9A59BA}"/>
               </a:ext>
             </a:extLst>
           </p:cNvPr>
@@ -1796,7 +1796,7 @@
           <p:cNvPr id="4" name="Date Placeholder 3">
             <a:extLst>
               <a:ext uri="{FF2B5EF4-FFF2-40B4-BE49-F238E27FC236}">
-                <a16:creationId xmlns:a16="http://schemas.microsoft.com/office/drawing/2014/main" id="{44E99186-7E5A-60AF-DE69-5C7DA71611AB}"/>
+                <a16:creationId xmlns:a16="http://schemas.microsoft.com/office/drawing/2014/main" xmlns="" id="{44E99186-7E5A-60AF-DE69-5C7DA71611AB}"/>
               </a:ext>
             </a:extLst>
           </p:cNvPr>
@@ -1825,7 +1825,7 @@
           <p:cNvPr id="5" name="Footer Placeholder 4">
             <a:extLst>
               <a:ext uri="{FF2B5EF4-FFF2-40B4-BE49-F238E27FC236}">
-                <a16:creationId xmlns:a16="http://schemas.microsoft.com/office/drawing/2014/main" id="{82FA13D1-1FBA-E820-323B-77B41F1A665D}"/>
+                <a16:creationId xmlns:a16="http://schemas.microsoft.com/office/drawing/2014/main" xmlns="" id="{82FA13D1-1FBA-E820-323B-77B41F1A665D}"/>
               </a:ext>
             </a:extLst>
           </p:cNvPr>
@@ -1854,7 +1854,7 @@
           <p:cNvPr id="6" name="Slide Number Placeholder 5">
             <a:extLst>
               <a:ext uri="{FF2B5EF4-FFF2-40B4-BE49-F238E27FC236}">
-                <a16:creationId xmlns:a16="http://schemas.microsoft.com/office/drawing/2014/main" id="{FB39BE85-85F6-4636-C651-D87CC969A49E}"/>
+                <a16:creationId xmlns:a16="http://schemas.microsoft.com/office/drawing/2014/main" xmlns="" id="{FB39BE85-85F6-4636-C651-D87CC969A49E}"/>
               </a:ext>
             </a:extLst>
           </p:cNvPr>
@@ -1889,7 +1889,7 @@
     <a:masterClrMapping/>
   </p:clrMapOvr>
   <mc:AlternateContent xmlns:mc="http://schemas.openxmlformats.org/markup-compatibility/2006">
-    <mc:Choice xmlns:p159="http://schemas.microsoft.com/office/powerpoint/2015/09/main" Requires="p159">
+    <mc:Choice xmlns:p159="http://schemas.microsoft.com/office/powerpoint/2015/09/main" xmlns="" Requires="p159">
       <p:transition xmlns:p14="http://schemas.microsoft.com/office/powerpoint/2010/main" spd="slow" p14:dur="2000">
         <p159:morph option="byObject"/>
       </p:transition>
@@ -1925,7 +1925,7 @@
           <p:cNvPr id="2" name="Title 1">
             <a:extLst>
               <a:ext uri="{FF2B5EF4-FFF2-40B4-BE49-F238E27FC236}">
-                <a16:creationId xmlns:a16="http://schemas.microsoft.com/office/drawing/2014/main" id="{FAF3BB49-A328-F121-7F27-DEB7C3CC2B0F}"/>
+                <a16:creationId xmlns:a16="http://schemas.microsoft.com/office/drawing/2014/main" xmlns="" id="{FAF3BB49-A328-F121-7F27-DEB7C3CC2B0F}"/>
               </a:ext>
             </a:extLst>
           </p:cNvPr>
@@ -1958,7 +1958,7 @@
           <p:cNvPr id="3" name="Content Placeholder 2">
             <a:extLst>
               <a:ext uri="{FF2B5EF4-FFF2-40B4-BE49-F238E27FC236}">
-                <a16:creationId xmlns:a16="http://schemas.microsoft.com/office/drawing/2014/main" id="{572E861E-DFBA-B4AA-9356-CDE3D3F57C04}"/>
+                <a16:creationId xmlns:a16="http://schemas.microsoft.com/office/drawing/2014/main" xmlns="" id="{572E861E-DFBA-B4AA-9356-CDE3D3F57C04}"/>
               </a:ext>
             </a:extLst>
           </p:cNvPr>
@@ -2020,7 +2020,7 @@
           <p:cNvPr id="4" name="Content Placeholder 3">
             <a:extLst>
               <a:ext uri="{FF2B5EF4-FFF2-40B4-BE49-F238E27FC236}">
-                <a16:creationId xmlns:a16="http://schemas.microsoft.com/office/drawing/2014/main" id="{451D7538-EC5A-3EE7-176F-A58920C50797}"/>
+                <a16:creationId xmlns:a16="http://schemas.microsoft.com/office/drawing/2014/main" xmlns="" id="{451D7538-EC5A-3EE7-176F-A58920C50797}"/>
               </a:ext>
             </a:extLst>
           </p:cNvPr>
@@ -2082,7 +2082,7 @@
           <p:cNvPr id="5" name="Date Placeholder 4">
             <a:extLst>
               <a:ext uri="{FF2B5EF4-FFF2-40B4-BE49-F238E27FC236}">
-                <a16:creationId xmlns:a16="http://schemas.microsoft.com/office/drawing/2014/main" id="{897D0B7E-1A60-DA52-6965-92412B1C2F9F}"/>
+                <a16:creationId xmlns:a16="http://schemas.microsoft.com/office/drawing/2014/main" xmlns="" id="{897D0B7E-1A60-DA52-6965-92412B1C2F9F}"/>
               </a:ext>
             </a:extLst>
           </p:cNvPr>
@@ -2111,7 +2111,7 @@
           <p:cNvPr id="6" name="Footer Placeholder 5">
             <a:extLst>
               <a:ext uri="{FF2B5EF4-FFF2-40B4-BE49-F238E27FC236}">
-                <a16:creationId xmlns:a16="http://schemas.microsoft.com/office/drawing/2014/main" id="{C2BDD5A2-CE3E-3215-6DAA-F75C0D1229DA}"/>
+                <a16:creationId xmlns:a16="http://schemas.microsoft.com/office/drawing/2014/main" xmlns="" id="{C2BDD5A2-CE3E-3215-6DAA-F75C0D1229DA}"/>
               </a:ext>
             </a:extLst>
           </p:cNvPr>
@@ -2140,7 +2140,7 @@
           <p:cNvPr id="7" name="Slide Number Placeholder 6">
             <a:extLst>
               <a:ext uri="{FF2B5EF4-FFF2-40B4-BE49-F238E27FC236}">
-                <a16:creationId xmlns:a16="http://schemas.microsoft.com/office/drawing/2014/main" id="{B1B822F1-284A-1786-FAF2-72129E2FE64D}"/>
+                <a16:creationId xmlns:a16="http://schemas.microsoft.com/office/drawing/2014/main" xmlns="" id="{B1B822F1-284A-1786-FAF2-72129E2FE64D}"/>
               </a:ext>
             </a:extLst>
           </p:cNvPr>
@@ -2175,7 +2175,7 @@
     <a:masterClrMapping/>
   </p:clrMapOvr>
   <mc:AlternateContent xmlns:mc="http://schemas.openxmlformats.org/markup-compatibility/2006">
-    <mc:Choice xmlns:p159="http://schemas.microsoft.com/office/powerpoint/2015/09/main" Requires="p159">
+    <mc:Choice xmlns:p159="http://schemas.microsoft.com/office/powerpoint/2015/09/main" xmlns="" Requires="p159">
       <p:transition xmlns:p14="http://schemas.microsoft.com/office/powerpoint/2010/main" spd="slow" p14:dur="2000">
         <p159:morph option="byObject"/>
       </p:transition>
@@ -2211,7 +2211,7 @@
           <p:cNvPr id="2" name="Title 1">
             <a:extLst>
               <a:ext uri="{FF2B5EF4-FFF2-40B4-BE49-F238E27FC236}">
-                <a16:creationId xmlns:a16="http://schemas.microsoft.com/office/drawing/2014/main" id="{41FEE969-634D-6E32-D227-18E9282C6F9E}"/>
+                <a16:creationId xmlns:a16="http://schemas.microsoft.com/office/drawing/2014/main" xmlns="" id="{41FEE969-634D-6E32-D227-18E9282C6F9E}"/>
               </a:ext>
             </a:extLst>
           </p:cNvPr>
@@ -2244,7 +2244,7 @@
           <p:cNvPr id="3" name="Text Placeholder 2">
             <a:extLst>
               <a:ext uri="{FF2B5EF4-FFF2-40B4-BE49-F238E27FC236}">
-                <a16:creationId xmlns:a16="http://schemas.microsoft.com/office/drawing/2014/main" id="{61CD26D4-290A-F0ED-7D62-41EDA6FEC2B9}"/>
+                <a16:creationId xmlns:a16="http://schemas.microsoft.com/office/drawing/2014/main" xmlns="" id="{61CD26D4-290A-F0ED-7D62-41EDA6FEC2B9}"/>
               </a:ext>
             </a:extLst>
           </p:cNvPr>
@@ -2320,7 +2320,7 @@
           <p:cNvPr id="4" name="Content Placeholder 3">
             <a:extLst>
               <a:ext uri="{FF2B5EF4-FFF2-40B4-BE49-F238E27FC236}">
-                <a16:creationId xmlns:a16="http://schemas.microsoft.com/office/drawing/2014/main" id="{94DA52B0-7419-A946-4523-6D34BCAD26D1}"/>
+                <a16:creationId xmlns:a16="http://schemas.microsoft.com/office/drawing/2014/main" xmlns="" id="{94DA52B0-7419-A946-4523-6D34BCAD26D1}"/>
               </a:ext>
             </a:extLst>
           </p:cNvPr>
@@ -2382,7 +2382,7 @@
           <p:cNvPr id="5" name="Text Placeholder 4">
             <a:extLst>
               <a:ext uri="{FF2B5EF4-FFF2-40B4-BE49-F238E27FC236}">
-                <a16:creationId xmlns:a16="http://schemas.microsoft.com/office/drawing/2014/main" id="{06536620-C4F3-EEC3-DBF1-05196B1CBB55}"/>
+                <a16:creationId xmlns:a16="http://schemas.microsoft.com/office/drawing/2014/main" xmlns="" id="{06536620-C4F3-EEC3-DBF1-05196B1CBB55}"/>
               </a:ext>
             </a:extLst>
           </p:cNvPr>
@@ -2458,7 +2458,7 @@
           <p:cNvPr id="6" name="Content Placeholder 5">
             <a:extLst>
               <a:ext uri="{FF2B5EF4-FFF2-40B4-BE49-F238E27FC236}">
-                <a16:creationId xmlns:a16="http://schemas.microsoft.com/office/drawing/2014/main" id="{33BAE980-E611-98B5-04E9-DE4584B0E33F}"/>
+                <a16:creationId xmlns:a16="http://schemas.microsoft.com/office/drawing/2014/main" xmlns="" id="{33BAE980-E611-98B5-04E9-DE4584B0E33F}"/>
               </a:ext>
             </a:extLst>
           </p:cNvPr>
@@ -2520,7 +2520,7 @@
           <p:cNvPr id="7" name="Date Placeholder 6">
             <a:extLst>
               <a:ext uri="{FF2B5EF4-FFF2-40B4-BE49-F238E27FC236}">
-                <a16:creationId xmlns:a16="http://schemas.microsoft.com/office/drawing/2014/main" id="{4E3B3581-658A-8487-F9CB-E79F2BFF27E4}"/>
+                <a16:creationId xmlns:a16="http://schemas.microsoft.com/office/drawing/2014/main" xmlns="" id="{4E3B3581-658A-8487-F9CB-E79F2BFF27E4}"/>
               </a:ext>
             </a:extLst>
           </p:cNvPr>
@@ -2549,7 +2549,7 @@
           <p:cNvPr id="8" name="Footer Placeholder 7">
             <a:extLst>
               <a:ext uri="{FF2B5EF4-FFF2-40B4-BE49-F238E27FC236}">
-                <a16:creationId xmlns:a16="http://schemas.microsoft.com/office/drawing/2014/main" id="{949D76D8-9033-26CF-BF4C-AECCC685C177}"/>
+                <a16:creationId xmlns:a16="http://schemas.microsoft.com/office/drawing/2014/main" xmlns="" id="{949D76D8-9033-26CF-BF4C-AECCC685C177}"/>
               </a:ext>
             </a:extLst>
           </p:cNvPr>
@@ -2578,7 +2578,7 @@
           <p:cNvPr id="9" name="Slide Number Placeholder 8">
             <a:extLst>
               <a:ext uri="{FF2B5EF4-FFF2-40B4-BE49-F238E27FC236}">
-                <a16:creationId xmlns:a16="http://schemas.microsoft.com/office/drawing/2014/main" id="{E02A06B8-CC1D-542F-D8EB-7625046B91D2}"/>
+                <a16:creationId xmlns:a16="http://schemas.microsoft.com/office/drawing/2014/main" xmlns="" id="{E02A06B8-CC1D-542F-D8EB-7625046B91D2}"/>
               </a:ext>
             </a:extLst>
           </p:cNvPr>
@@ -2613,7 +2613,7 @@
     <a:masterClrMapping/>
   </p:clrMapOvr>
   <mc:AlternateContent xmlns:mc="http://schemas.openxmlformats.org/markup-compatibility/2006">
-    <mc:Choice xmlns:p159="http://schemas.microsoft.com/office/powerpoint/2015/09/main" Requires="p159">
+    <mc:Choice xmlns:p159="http://schemas.microsoft.com/office/powerpoint/2015/09/main" xmlns="" Requires="p159">
       <p:transition xmlns:p14="http://schemas.microsoft.com/office/powerpoint/2010/main" spd="slow" p14:dur="2000">
         <p159:morph option="byObject"/>
       </p:transition>
@@ -2649,7 +2649,7 @@
           <p:cNvPr id="2" name="Title 1">
             <a:extLst>
               <a:ext uri="{FF2B5EF4-FFF2-40B4-BE49-F238E27FC236}">
-                <a16:creationId xmlns:a16="http://schemas.microsoft.com/office/drawing/2014/main" id="{666A9F42-7FF7-F803-C075-BC4968D35E34}"/>
+                <a16:creationId xmlns:a16="http://schemas.microsoft.com/office/drawing/2014/main" xmlns="" id="{666A9F42-7FF7-F803-C075-BC4968D35E34}"/>
               </a:ext>
             </a:extLst>
           </p:cNvPr>
@@ -2677,7 +2677,7 @@
           <p:cNvPr id="3" name="Date Placeholder 2">
             <a:extLst>
               <a:ext uri="{FF2B5EF4-FFF2-40B4-BE49-F238E27FC236}">
-                <a16:creationId xmlns:a16="http://schemas.microsoft.com/office/drawing/2014/main" id="{E89E8268-7232-2944-F1BD-399F9419B563}"/>
+                <a16:creationId xmlns:a16="http://schemas.microsoft.com/office/drawing/2014/main" xmlns="" id="{E89E8268-7232-2944-F1BD-399F9419B563}"/>
               </a:ext>
             </a:extLst>
           </p:cNvPr>
@@ -2706,7 +2706,7 @@
           <p:cNvPr id="4" name="Footer Placeholder 3">
             <a:extLst>
               <a:ext uri="{FF2B5EF4-FFF2-40B4-BE49-F238E27FC236}">
-                <a16:creationId xmlns:a16="http://schemas.microsoft.com/office/drawing/2014/main" id="{6B968DDD-323F-89A1-84E3-DDBA626D9386}"/>
+                <a16:creationId xmlns:a16="http://schemas.microsoft.com/office/drawing/2014/main" xmlns="" id="{6B968DDD-323F-89A1-84E3-DDBA626D9386}"/>
               </a:ext>
             </a:extLst>
           </p:cNvPr>
@@ -2735,7 +2735,7 @@
           <p:cNvPr id="5" name="Slide Number Placeholder 4">
             <a:extLst>
               <a:ext uri="{FF2B5EF4-FFF2-40B4-BE49-F238E27FC236}">
-                <a16:creationId xmlns:a16="http://schemas.microsoft.com/office/drawing/2014/main" id="{98FBDC76-671D-1671-DCE2-D5658BD40E29}"/>
+                <a16:creationId xmlns:a16="http://schemas.microsoft.com/office/drawing/2014/main" xmlns="" id="{98FBDC76-671D-1671-DCE2-D5658BD40E29}"/>
               </a:ext>
             </a:extLst>
           </p:cNvPr>
@@ -2770,7 +2770,7 @@
     <a:masterClrMapping/>
   </p:clrMapOvr>
   <mc:AlternateContent xmlns:mc="http://schemas.openxmlformats.org/markup-compatibility/2006">
-    <mc:Choice xmlns:p159="http://schemas.microsoft.com/office/powerpoint/2015/09/main" Requires="p159">
+    <mc:Choice xmlns:p159="http://schemas.microsoft.com/office/powerpoint/2015/09/main" xmlns="" Requires="p159">
       <p:transition xmlns:p14="http://schemas.microsoft.com/office/powerpoint/2010/main" spd="slow" p14:dur="2000">
         <p159:morph option="byObject"/>
       </p:transition>
@@ -2806,7 +2806,7 @@
           <p:cNvPr id="2" name="Date Placeholder 1">
             <a:extLst>
               <a:ext uri="{FF2B5EF4-FFF2-40B4-BE49-F238E27FC236}">
-                <a16:creationId xmlns:a16="http://schemas.microsoft.com/office/drawing/2014/main" id="{49BC4D82-0182-501C-9231-46767680476E}"/>
+                <a16:creationId xmlns:a16="http://schemas.microsoft.com/office/drawing/2014/main" xmlns="" id="{49BC4D82-0182-501C-9231-46767680476E}"/>
               </a:ext>
             </a:extLst>
           </p:cNvPr>
@@ -2835,7 +2835,7 @@
           <p:cNvPr id="3" name="Footer Placeholder 2">
             <a:extLst>
               <a:ext uri="{FF2B5EF4-FFF2-40B4-BE49-F238E27FC236}">
-                <a16:creationId xmlns:a16="http://schemas.microsoft.com/office/drawing/2014/main" id="{10EAA6C9-A7F3-19F1-D17C-A1D83FAF553F}"/>
+                <a16:creationId xmlns:a16="http://schemas.microsoft.com/office/drawing/2014/main" xmlns="" id="{10EAA6C9-A7F3-19F1-D17C-A1D83FAF553F}"/>
               </a:ext>
             </a:extLst>
           </p:cNvPr>
@@ -2864,7 +2864,7 @@
           <p:cNvPr id="4" name="Slide Number Placeholder 3">
             <a:extLst>
               <a:ext uri="{FF2B5EF4-FFF2-40B4-BE49-F238E27FC236}">
-                <a16:creationId xmlns:a16="http://schemas.microsoft.com/office/drawing/2014/main" id="{34EBB816-1B94-116F-92D4-6043AE9E0C6B}"/>
+                <a16:creationId xmlns:a16="http://schemas.microsoft.com/office/drawing/2014/main" xmlns="" id="{34EBB816-1B94-116F-92D4-6043AE9E0C6B}"/>
               </a:ext>
             </a:extLst>
           </p:cNvPr>
@@ -2899,7 +2899,7 @@
     <a:masterClrMapping/>
   </p:clrMapOvr>
   <mc:AlternateContent xmlns:mc="http://schemas.openxmlformats.org/markup-compatibility/2006">
-    <mc:Choice xmlns:p159="http://schemas.microsoft.com/office/powerpoint/2015/09/main" Requires="p159">
+    <mc:Choice xmlns:p159="http://schemas.microsoft.com/office/powerpoint/2015/09/main" xmlns="" Requires="p159">
       <p:transition xmlns:p14="http://schemas.microsoft.com/office/powerpoint/2010/main" spd="slow" p14:dur="2000">
         <p159:morph option="byObject"/>
       </p:transition>
@@ -2935,7 +2935,7 @@
           <p:cNvPr id="2" name="Title 1">
             <a:extLst>
               <a:ext uri="{FF2B5EF4-FFF2-40B4-BE49-F238E27FC236}">
-                <a16:creationId xmlns:a16="http://schemas.microsoft.com/office/drawing/2014/main" id="{C350C37F-77BE-E128-4248-D001C39E79C6}"/>
+                <a16:creationId xmlns:a16="http://schemas.microsoft.com/office/drawing/2014/main" xmlns="" id="{C350C37F-77BE-E128-4248-D001C39E79C6}"/>
               </a:ext>
             </a:extLst>
           </p:cNvPr>
@@ -2974,7 +2974,7 @@
           <p:cNvPr id="3" name="Content Placeholder 2">
             <a:extLst>
               <a:ext uri="{FF2B5EF4-FFF2-40B4-BE49-F238E27FC236}">
-                <a16:creationId xmlns:a16="http://schemas.microsoft.com/office/drawing/2014/main" id="{2F3B20A8-A604-C977-02C0-083BA8663484}"/>
+                <a16:creationId xmlns:a16="http://schemas.microsoft.com/office/drawing/2014/main" xmlns="" id="{2F3B20A8-A604-C977-02C0-083BA8663484}"/>
               </a:ext>
             </a:extLst>
           </p:cNvPr>
@@ -3066,7 +3066,7 @@
           <p:cNvPr id="4" name="Text Placeholder 3">
             <a:extLst>
               <a:ext uri="{FF2B5EF4-FFF2-40B4-BE49-F238E27FC236}">
-                <a16:creationId xmlns:a16="http://schemas.microsoft.com/office/drawing/2014/main" id="{EC0EEBFB-2026-6A35-33ED-F008376B67A0}"/>
+                <a16:creationId xmlns:a16="http://schemas.microsoft.com/office/drawing/2014/main" xmlns="" id="{EC0EEBFB-2026-6A35-33ED-F008376B67A0}"/>
               </a:ext>
             </a:extLst>
           </p:cNvPr>
@@ -3139,7 +3139,7 @@
           <p:cNvPr id="5" name="Date Placeholder 4">
             <a:extLst>
               <a:ext uri="{FF2B5EF4-FFF2-40B4-BE49-F238E27FC236}">
-                <a16:creationId xmlns:a16="http://schemas.microsoft.com/office/drawing/2014/main" id="{93F05638-7A56-469A-825A-1DFA600254C8}"/>
+                <a16:creationId xmlns:a16="http://schemas.microsoft.com/office/drawing/2014/main" xmlns="" id="{93F05638-7A56-469A-825A-1DFA600254C8}"/>
               </a:ext>
             </a:extLst>
           </p:cNvPr>
@@ -3168,7 +3168,7 @@
           <p:cNvPr id="6" name="Footer Placeholder 5">
             <a:extLst>
               <a:ext uri="{FF2B5EF4-FFF2-40B4-BE49-F238E27FC236}">
-                <a16:creationId xmlns:a16="http://schemas.microsoft.com/office/drawing/2014/main" id="{9C85A215-184B-2105-0279-ED02F6445831}"/>
+                <a16:creationId xmlns:a16="http://schemas.microsoft.com/office/drawing/2014/main" xmlns="" id="{9C85A215-184B-2105-0279-ED02F6445831}"/>
               </a:ext>
             </a:extLst>
           </p:cNvPr>
@@ -3197,7 +3197,7 @@
           <p:cNvPr id="7" name="Slide Number Placeholder 6">
             <a:extLst>
               <a:ext uri="{FF2B5EF4-FFF2-40B4-BE49-F238E27FC236}">
-                <a16:creationId xmlns:a16="http://schemas.microsoft.com/office/drawing/2014/main" id="{32C7CA46-892B-253A-3A28-7414E17B837B}"/>
+                <a16:creationId xmlns:a16="http://schemas.microsoft.com/office/drawing/2014/main" xmlns="" id="{32C7CA46-892B-253A-3A28-7414E17B837B}"/>
               </a:ext>
             </a:extLst>
           </p:cNvPr>
@@ -3232,7 +3232,7 @@
     <a:masterClrMapping/>
   </p:clrMapOvr>
   <mc:AlternateContent xmlns:mc="http://schemas.openxmlformats.org/markup-compatibility/2006">
-    <mc:Choice xmlns:p159="http://schemas.microsoft.com/office/powerpoint/2015/09/main" Requires="p159">
+    <mc:Choice xmlns:p159="http://schemas.microsoft.com/office/powerpoint/2015/09/main" xmlns="" Requires="p159">
       <p:transition xmlns:p14="http://schemas.microsoft.com/office/powerpoint/2010/main" spd="slow" p14:dur="2000">
         <p159:morph option="byObject"/>
       </p:transition>
@@ -3268,7 +3268,7 @@
           <p:cNvPr id="2" name="Title 1">
             <a:extLst>
               <a:ext uri="{FF2B5EF4-FFF2-40B4-BE49-F238E27FC236}">
-                <a16:creationId xmlns:a16="http://schemas.microsoft.com/office/drawing/2014/main" id="{EFB06A09-98CF-FAC2-3708-AECC4360C651}"/>
+                <a16:creationId xmlns:a16="http://schemas.microsoft.com/office/drawing/2014/main" xmlns="" id="{EFB06A09-98CF-FAC2-3708-AECC4360C651}"/>
               </a:ext>
             </a:extLst>
           </p:cNvPr>
@@ -3307,7 +3307,7 @@
           <p:cNvPr id="3" name="Picture Placeholder 2">
             <a:extLst>
               <a:ext uri="{FF2B5EF4-FFF2-40B4-BE49-F238E27FC236}">
-                <a16:creationId xmlns:a16="http://schemas.microsoft.com/office/drawing/2014/main" id="{9571C769-CEC8-962A-01E6-15B0E056791E}"/>
+                <a16:creationId xmlns:a16="http://schemas.microsoft.com/office/drawing/2014/main" xmlns="" id="{9571C769-CEC8-962A-01E6-15B0E056791E}"/>
               </a:ext>
             </a:extLst>
           </p:cNvPr>
@@ -3374,7 +3374,7 @@
           <p:cNvPr id="4" name="Text Placeholder 3">
             <a:extLst>
               <a:ext uri="{FF2B5EF4-FFF2-40B4-BE49-F238E27FC236}">
-                <a16:creationId xmlns:a16="http://schemas.microsoft.com/office/drawing/2014/main" id="{F32C4A61-EF2A-C5A5-B150-4448600B3937}"/>
+                <a16:creationId xmlns:a16="http://schemas.microsoft.com/office/drawing/2014/main" xmlns="" id="{F32C4A61-EF2A-C5A5-B150-4448600B3937}"/>
               </a:ext>
             </a:extLst>
           </p:cNvPr>
@@ -3445,7 +3445,7 @@
           <p:cNvPr id="5" name="Date Placeholder 4">
             <a:extLst>
               <a:ext uri="{FF2B5EF4-FFF2-40B4-BE49-F238E27FC236}">
-                <a16:creationId xmlns:a16="http://schemas.microsoft.com/office/drawing/2014/main" id="{920B235E-39C7-4C78-20EF-DB48ECD9CB90}"/>
+                <a16:creationId xmlns:a16="http://schemas.microsoft.com/office/drawing/2014/main" xmlns="" id="{920B235E-39C7-4C78-20EF-DB48ECD9CB90}"/>
               </a:ext>
             </a:extLst>
           </p:cNvPr>
@@ -3474,7 +3474,7 @@
           <p:cNvPr id="6" name="Footer Placeholder 5">
             <a:extLst>
               <a:ext uri="{FF2B5EF4-FFF2-40B4-BE49-F238E27FC236}">
-                <a16:creationId xmlns:a16="http://schemas.microsoft.com/office/drawing/2014/main" id="{7FDC75DA-9A78-9AB9-7171-95A08CC51C56}"/>
+                <a16:creationId xmlns:a16="http://schemas.microsoft.com/office/drawing/2014/main" xmlns="" id="{7FDC75DA-9A78-9AB9-7171-95A08CC51C56}"/>
               </a:ext>
             </a:extLst>
           </p:cNvPr>
@@ -3503,7 +3503,7 @@
           <p:cNvPr id="7" name="Slide Number Placeholder 6">
             <a:extLst>
               <a:ext uri="{FF2B5EF4-FFF2-40B4-BE49-F238E27FC236}">
-                <a16:creationId xmlns:a16="http://schemas.microsoft.com/office/drawing/2014/main" id="{5EFE1A03-DCCB-53C7-DBFE-2AD55C90591B}"/>
+                <a16:creationId xmlns:a16="http://schemas.microsoft.com/office/drawing/2014/main" xmlns="" id="{5EFE1A03-DCCB-53C7-DBFE-2AD55C90591B}"/>
               </a:ext>
             </a:extLst>
           </p:cNvPr>
@@ -3538,7 +3538,7 @@
     <a:masterClrMapping/>
   </p:clrMapOvr>
   <mc:AlternateContent xmlns:mc="http://schemas.openxmlformats.org/markup-compatibility/2006">
-    <mc:Choice xmlns:p159="http://schemas.microsoft.com/office/powerpoint/2015/09/main" Requires="p159">
+    <mc:Choice xmlns:p159="http://schemas.microsoft.com/office/powerpoint/2015/09/main" xmlns="" Requires="p159">
       <p:transition xmlns:p14="http://schemas.microsoft.com/office/powerpoint/2010/main" spd="slow" p14:dur="2000">
         <p159:morph option="byObject"/>
       </p:transition>
@@ -3579,7 +3579,7 @@
           <p:cNvPr id="2" name="Title Placeholder 1">
             <a:extLst>
               <a:ext uri="{FF2B5EF4-FFF2-40B4-BE49-F238E27FC236}">
-                <a16:creationId xmlns:a16="http://schemas.microsoft.com/office/drawing/2014/main" id="{475BFB69-9245-EC58-F1DE-FEB625BD336A}"/>
+                <a16:creationId xmlns:a16="http://schemas.microsoft.com/office/drawing/2014/main" xmlns="" id="{475BFB69-9245-EC58-F1DE-FEB625BD336A}"/>
               </a:ext>
             </a:extLst>
           </p:cNvPr>
@@ -3617,7 +3617,7 @@
           <p:cNvPr id="3" name="Text Placeholder 2">
             <a:extLst>
               <a:ext uri="{FF2B5EF4-FFF2-40B4-BE49-F238E27FC236}">
-                <a16:creationId xmlns:a16="http://schemas.microsoft.com/office/drawing/2014/main" id="{5516AFD5-5144-C460-0CA4-644BC4A93C02}"/>
+                <a16:creationId xmlns:a16="http://schemas.microsoft.com/office/drawing/2014/main" xmlns="" id="{5516AFD5-5144-C460-0CA4-644BC4A93C02}"/>
               </a:ext>
             </a:extLst>
           </p:cNvPr>
@@ -3684,7 +3684,7 @@
           <p:cNvPr id="4" name="Date Placeholder 3">
             <a:extLst>
               <a:ext uri="{FF2B5EF4-FFF2-40B4-BE49-F238E27FC236}">
-                <a16:creationId xmlns:a16="http://schemas.microsoft.com/office/drawing/2014/main" id="{3995753E-AF8A-7E04-8A1A-205B755A0215}"/>
+                <a16:creationId xmlns:a16="http://schemas.microsoft.com/office/drawing/2014/main" xmlns="" id="{3995753E-AF8A-7E04-8A1A-205B755A0215}"/>
               </a:ext>
             </a:extLst>
           </p:cNvPr>
@@ -3729,7 +3729,7 @@
           <p:cNvPr id="5" name="Footer Placeholder 4">
             <a:extLst>
               <a:ext uri="{FF2B5EF4-FFF2-40B4-BE49-F238E27FC236}">
-                <a16:creationId xmlns:a16="http://schemas.microsoft.com/office/drawing/2014/main" id="{D4E1B7C8-DA74-800B-EE14-A39E9DB32DE4}"/>
+                <a16:creationId xmlns:a16="http://schemas.microsoft.com/office/drawing/2014/main" xmlns="" id="{D4E1B7C8-DA74-800B-EE14-A39E9DB32DE4}"/>
               </a:ext>
             </a:extLst>
           </p:cNvPr>
@@ -3774,7 +3774,7 @@
           <p:cNvPr id="6" name="Slide Number Placeholder 5">
             <a:extLst>
               <a:ext uri="{FF2B5EF4-FFF2-40B4-BE49-F238E27FC236}">
-                <a16:creationId xmlns:a16="http://schemas.microsoft.com/office/drawing/2014/main" id="{7AC1647D-0DF0-CA1B-F723-EF7B8F508DB7}"/>
+                <a16:creationId xmlns:a16="http://schemas.microsoft.com/office/drawing/2014/main" xmlns="" id="{7AC1647D-0DF0-CA1B-F723-EF7B8F508DB7}"/>
               </a:ext>
             </a:extLst>
           </p:cNvPr>
@@ -3837,7 +3837,7 @@
     <p:sldLayoutId id="2147483861" r:id="rId12"/>
   </p:sldLayoutIdLst>
   <mc:AlternateContent xmlns:mc="http://schemas.openxmlformats.org/markup-compatibility/2006">
-    <mc:Choice xmlns:p159="http://schemas.microsoft.com/office/powerpoint/2015/09/main" Requires="p159">
+    <mc:Choice xmlns:p159="http://schemas.microsoft.com/office/powerpoint/2015/09/main" xmlns="" Requires="p159">
       <p:transition xmlns:p14="http://schemas.microsoft.com/office/powerpoint/2010/main" spd="slow" p14:dur="2000">
         <p159:morph option="byObject"/>
       </p:transition>
@@ -4178,10 +4178,10 @@
           <p:cNvPr id="6" name="Rectangle 5">
             <a:extLst>
               <a:ext uri="{FF2B5EF4-FFF2-40B4-BE49-F238E27FC236}">
-                <a16:creationId xmlns:a16="http://schemas.microsoft.com/office/drawing/2014/main" id="{32D45EE4-C4F0-4F72-B1C6-39F596D138A9}"/>
+                <a16:creationId xmlns:a16="http://schemas.microsoft.com/office/drawing/2014/main" xmlns="" id="{32D45EE4-C4F0-4F72-B1C6-39F596D138A9}"/>
               </a:ext>
               <a:ext uri="{C183D7F6-B498-43B3-948B-1728B52AA6E4}">
-                <adec:decorative xmlns:adec="http://schemas.microsoft.com/office/drawing/2017/decorative" val="1"/>
+                <adec:decorative xmlns:adec="http://schemas.microsoft.com/office/drawing/2017/decorative" xmlns="" val="1"/>
               </a:ext>
             </a:extLst>
           </p:cNvPr>
@@ -4191,7 +4191,7 @@
           <p:nvPr>
             <p:extLst>
               <p:ext uri="{386F3935-93C4-4BCD-93E2-E3B085C9AB24}">
-                <p16:designElem xmlns:p16="http://schemas.microsoft.com/office/powerpoint/2015/main" val="1"/>
+                <p16:designElem xmlns:p16="http://schemas.microsoft.com/office/powerpoint/2015/main" xmlns="" val="1"/>
               </p:ext>
             </p:extLst>
           </p:nvPr>
@@ -4238,10 +4238,10 @@
           <p:cNvPr id="7" name="Oval 6">
             <a:extLst>
               <a:ext uri="{FF2B5EF4-FFF2-40B4-BE49-F238E27FC236}">
-                <a16:creationId xmlns:a16="http://schemas.microsoft.com/office/drawing/2014/main" id="{8C459BAD-4279-4A9D-B0C5-662C5F5ED21F}"/>
+                <a16:creationId xmlns:a16="http://schemas.microsoft.com/office/drawing/2014/main" xmlns="" id="{8C459BAD-4279-4A9D-B0C5-662C5F5ED21F}"/>
               </a:ext>
               <a:ext uri="{C183D7F6-B498-43B3-948B-1728B52AA6E4}">
-                <adec:decorative xmlns:adec="http://schemas.microsoft.com/office/drawing/2017/decorative" val="1"/>
+                <adec:decorative xmlns:adec="http://schemas.microsoft.com/office/drawing/2017/decorative" xmlns="" val="1"/>
               </a:ext>
             </a:extLst>
           </p:cNvPr>
@@ -4251,7 +4251,7 @@
           <p:nvPr>
             <p:extLst>
               <p:ext uri="{386F3935-93C4-4BCD-93E2-E3B085C9AB24}">
-                <p16:designElem xmlns:p16="http://schemas.microsoft.com/office/powerpoint/2015/main" val="1"/>
+                <p16:designElem xmlns:p16="http://schemas.microsoft.com/office/powerpoint/2015/main" xmlns="" val="1"/>
               </p:ext>
             </p:extLst>
           </p:nvPr>
@@ -4358,7 +4358,7 @@
             </a:solidFill>
             <a:extLst>
               <a:ext uri="{C807C97D-BFC1-408E-A445-0C87EB9F89A2}">
-                <ask:lineSketchStyleProps xmlns:ask="http://schemas.microsoft.com/office/drawing/2018/sketchyshapes" sd="63743190">
+                <ask:lineSketchStyleProps xmlns:ask="http://schemas.microsoft.com/office/drawing/2018/sketchyshapes" xmlns="" sd="63743190">
                   <a:prstGeom prst="ellipse">
                     <a:avLst/>
                   </a:prstGeom>
@@ -4400,7 +4400,7 @@
           <p:cNvPr id="2" name="Title 1">
             <a:extLst>
               <a:ext uri="{FF2B5EF4-FFF2-40B4-BE49-F238E27FC236}">
-                <a16:creationId xmlns:a16="http://schemas.microsoft.com/office/drawing/2014/main" id="{02A696C0-3C84-5552-5A47-B4F94269329E}"/>
+                <a16:creationId xmlns:a16="http://schemas.microsoft.com/office/drawing/2014/main" xmlns="" id="{02A696C0-3C84-5552-5A47-B4F94269329E}"/>
               </a:ext>
             </a:extLst>
           </p:cNvPr>
@@ -4441,7 +4441,7 @@
           <p:cNvPr id="3" name="Subtitle 2">
             <a:extLst>
               <a:ext uri="{FF2B5EF4-FFF2-40B4-BE49-F238E27FC236}">
-                <a16:creationId xmlns:a16="http://schemas.microsoft.com/office/drawing/2014/main" id="{1C855944-A270-99E0-04E3-BE41825A6543}"/>
+                <a16:creationId xmlns:a16="http://schemas.microsoft.com/office/drawing/2014/main" xmlns="" id="{1C855944-A270-99E0-04E3-BE41825A6543}"/>
               </a:ext>
             </a:extLst>
           </p:cNvPr>
@@ -4513,7 +4513,7 @@
               </a:rPr>
               <a:t>BIM (B)</a:t>
             </a:r>
-            <a:endParaRPr lang="en-NP" sz="2000">
+            <a:endParaRPr lang="x-none" sz="2000">
               <a:solidFill>
                 <a:srgbClr val="FFFFFF"/>
               </a:solidFill>
@@ -4528,10 +4528,10 @@
           <p:cNvPr id="13" name="sketch line">
             <a:extLst>
               <a:ext uri="{FF2B5EF4-FFF2-40B4-BE49-F238E27FC236}">
-                <a16:creationId xmlns:a16="http://schemas.microsoft.com/office/drawing/2014/main" id="{0953BC39-9D68-40BE-BF3C-5C4EB782AF94}"/>
+                <a16:creationId xmlns:a16="http://schemas.microsoft.com/office/drawing/2014/main" xmlns="" id="{0953BC39-9D68-40BE-BF3C-5C4EB782AF94}"/>
               </a:ext>
               <a:ext uri="{C183D7F6-B498-43B3-948B-1728B52AA6E4}">
-                <adec:decorative xmlns:adec="http://schemas.microsoft.com/office/drawing/2017/decorative" val="1"/>
+                <adec:decorative xmlns:adec="http://schemas.microsoft.com/office/drawing/2017/decorative" xmlns="" val="1"/>
               </a:ext>
             </a:extLst>
           </p:cNvPr>
@@ -4541,7 +4541,7 @@
           <p:nvPr>
             <p:extLst>
               <p:ext uri="{386F3935-93C4-4BCD-93E2-E3B085C9AB24}">
-                <p16:designElem xmlns:p16="http://schemas.microsoft.com/office/powerpoint/2015/main" val="1"/>
+                <p16:designElem xmlns:p16="http://schemas.microsoft.com/office/powerpoint/2015/main" xmlns="" val="1"/>
               </p:ext>
             </p:extLst>
           </p:nvPr>
@@ -4829,7 +4829,7 @@
             <a:round/>
             <a:extLst>
               <a:ext uri="{C807C97D-BFC1-408E-A445-0C87EB9F89A2}">
-                <ask:lineSketchStyleProps xmlns:ask="http://schemas.microsoft.com/office/drawing/2018/sketchyshapes" sd="1219033472">
+                <ask:lineSketchStyleProps xmlns:ask="http://schemas.microsoft.com/office/drawing/2018/sketchyshapes" xmlns="" sd="1219033472">
                   <a:prstGeom prst="rect">
                     <a:avLst/>
                   </a:prstGeom>
@@ -4871,7 +4871,7 @@
           <p:cNvPr id="4" name="Slide Number Placeholder 3">
             <a:extLst>
               <a:ext uri="{FF2B5EF4-FFF2-40B4-BE49-F238E27FC236}">
-                <a16:creationId xmlns:a16="http://schemas.microsoft.com/office/drawing/2014/main" id="{35053FB5-F943-8188-6F61-147B21FE103C}"/>
+                <a16:creationId xmlns:a16="http://schemas.microsoft.com/office/drawing/2014/main" xmlns="" id="{35053FB5-F943-8188-6F61-147B21FE103C}"/>
               </a:ext>
             </a:extLst>
           </p:cNvPr>
@@ -4900,7 +4900,7 @@
               </a:spcAft>
             </a:pPr>
             <a:fld id="{81FEE814-E9C2-BC4F-99F5-ABB679497227}" type="slidenum">
-              <a:rPr lang="en-NP" sz="2800" dirty="0" smtClean="0">
+              <a:rPr lang="x-none" sz="2800" dirty="0" smtClean="0">
                 <a:latin typeface="Times New Roman"/>
                 <a:cs typeface="Times New Roman"/>
               </a:rPr>
@@ -4929,7 +4929,7 @@
     <a:masterClrMapping/>
   </p:clrMapOvr>
   <mc:AlternateContent xmlns:mc="http://schemas.openxmlformats.org/markup-compatibility/2006">
-    <mc:Choice xmlns:p159="http://schemas.microsoft.com/office/powerpoint/2015/09/main" Requires="p159">
+    <mc:Choice xmlns:p159="http://schemas.microsoft.com/office/powerpoint/2015/09/main" xmlns="" Requires="p159">
       <p:transition xmlns:p14="http://schemas.microsoft.com/office/powerpoint/2010/main" spd="slow" p14:dur="2000">
         <p159:morph option="byObject"/>
       </p:transition>
@@ -4973,10 +4973,10 @@
           <p:cNvPr id="102" name="Rectangle 101">
             <a:extLst>
               <a:ext uri="{FF2B5EF4-FFF2-40B4-BE49-F238E27FC236}">
-                <a16:creationId xmlns:a16="http://schemas.microsoft.com/office/drawing/2014/main" id="{058A14AF-9FB5-4CC7-BA35-E8E85D3EDF0E}"/>
+                <a16:creationId xmlns:a16="http://schemas.microsoft.com/office/drawing/2014/main" xmlns="" id="{058A14AF-9FB5-4CC7-BA35-E8E85D3EDF0E}"/>
               </a:ext>
               <a:ext uri="{C183D7F6-B498-43B3-948B-1728B52AA6E4}">
-                <adec:decorative xmlns:adec="http://schemas.microsoft.com/office/drawing/2017/decorative" val="1"/>
+                <adec:decorative xmlns:adec="http://schemas.microsoft.com/office/drawing/2017/decorative" xmlns="" val="1"/>
               </a:ext>
             </a:extLst>
           </p:cNvPr>
@@ -4986,7 +4986,7 @@
           <p:nvPr>
             <p:extLst>
               <p:ext uri="{386F3935-93C4-4BCD-93E2-E3B085C9AB24}">
-                <p16:designElem xmlns:p16="http://schemas.microsoft.com/office/powerpoint/2015/main" val="1"/>
+                <p16:designElem xmlns:p16="http://schemas.microsoft.com/office/powerpoint/2015/main" xmlns="" val="1"/>
               </p:ext>
             </p:extLst>
           </p:nvPr>
@@ -5033,7 +5033,7 @@
           <p:cNvPr id="2" name="Title 1">
             <a:extLst>
               <a:ext uri="{FF2B5EF4-FFF2-40B4-BE49-F238E27FC236}">
-                <a16:creationId xmlns:a16="http://schemas.microsoft.com/office/drawing/2014/main" id="{67C80B98-4B19-F431-A878-AC3855E470F3}"/>
+                <a16:creationId xmlns:a16="http://schemas.microsoft.com/office/drawing/2014/main" xmlns="" id="{67C80B98-4B19-F431-A878-AC3855E470F3}"/>
               </a:ext>
             </a:extLst>
           </p:cNvPr>
@@ -5074,10 +5074,10 @@
           <p:cNvPr id="104" name="Rectangle 103">
             <a:extLst>
               <a:ext uri="{FF2B5EF4-FFF2-40B4-BE49-F238E27FC236}">
-                <a16:creationId xmlns:a16="http://schemas.microsoft.com/office/drawing/2014/main" id="{3A9A4357-BD1D-4622-A4FE-766E6AB8DE84}"/>
+                <a16:creationId xmlns:a16="http://schemas.microsoft.com/office/drawing/2014/main" xmlns="" id="{3A9A4357-BD1D-4622-A4FE-766E6AB8DE84}"/>
               </a:ext>
               <a:ext uri="{C183D7F6-B498-43B3-948B-1728B52AA6E4}">
-                <adec:decorative xmlns:adec="http://schemas.microsoft.com/office/drawing/2017/decorative" val="1"/>
+                <adec:decorative xmlns:adec="http://schemas.microsoft.com/office/drawing/2017/decorative" xmlns="" val="1"/>
               </a:ext>
             </a:extLst>
           </p:cNvPr>
@@ -5087,7 +5087,7 @@
           <p:nvPr>
             <p:extLst>
               <p:ext uri="{386F3935-93C4-4BCD-93E2-E3B085C9AB24}">
-                <p16:designElem xmlns:p16="http://schemas.microsoft.com/office/powerpoint/2015/main" val="1"/>
+                <p16:designElem xmlns:p16="http://schemas.microsoft.com/office/powerpoint/2015/main" xmlns="" val="1"/>
               </p:ext>
             </p:extLst>
           </p:nvPr>
@@ -5137,10 +5137,10 @@
           <p:cNvPr id="106" name="Rectangle 105">
             <a:extLst>
               <a:ext uri="{FF2B5EF4-FFF2-40B4-BE49-F238E27FC236}">
-                <a16:creationId xmlns:a16="http://schemas.microsoft.com/office/drawing/2014/main" id="{E659831F-0D9A-4C63-9EBB-8435B85A440F}"/>
+                <a16:creationId xmlns:a16="http://schemas.microsoft.com/office/drawing/2014/main" xmlns="" id="{E659831F-0D9A-4C63-9EBB-8435B85A440F}"/>
               </a:ext>
               <a:ext uri="{C183D7F6-B498-43B3-948B-1728B52AA6E4}">
-                <adec:decorative xmlns:adec="http://schemas.microsoft.com/office/drawing/2017/decorative" val="1"/>
+                <adec:decorative xmlns:adec="http://schemas.microsoft.com/office/drawing/2017/decorative" xmlns="" val="1"/>
               </a:ext>
             </a:extLst>
           </p:cNvPr>
@@ -5150,7 +5150,7 @@
           <p:nvPr>
             <p:extLst>
               <p:ext uri="{386F3935-93C4-4BCD-93E2-E3B085C9AB24}">
-                <p16:designElem xmlns:p16="http://schemas.microsoft.com/office/powerpoint/2015/main" val="1"/>
+                <p16:designElem xmlns:p16="http://schemas.microsoft.com/office/powerpoint/2015/main" xmlns="" val="1"/>
               </p:ext>
             </p:extLst>
           </p:nvPr>
@@ -5207,7 +5207,7 @@
           <p:cNvPr id="3" name="Text Placeholder 2">
             <a:extLst>
               <a:ext uri="{FF2B5EF4-FFF2-40B4-BE49-F238E27FC236}">
-                <a16:creationId xmlns:a16="http://schemas.microsoft.com/office/drawing/2014/main" id="{5CFB902F-05CC-0DEC-2904-1284DA9CC60A}"/>
+                <a16:creationId xmlns:a16="http://schemas.microsoft.com/office/drawing/2014/main" xmlns="" id="{5CFB902F-05CC-0DEC-2904-1284DA9CC60A}"/>
               </a:ext>
             </a:extLst>
           </p:cNvPr>
@@ -5284,7 +5284,7 @@
           <p:cNvPr id="5" name="Picture 4" descr="A person sitting at a desk smoking a cigarette&#10;&#10;Description automatically generated">
             <a:extLst>
               <a:ext uri="{FF2B5EF4-FFF2-40B4-BE49-F238E27FC236}">
-                <a16:creationId xmlns:a16="http://schemas.microsoft.com/office/drawing/2014/main" id="{F149EF9A-B10A-5D25-FFE0-834CFA97481A}"/>
+                <a16:creationId xmlns:a16="http://schemas.microsoft.com/office/drawing/2014/main" xmlns="" id="{F149EF9A-B10A-5D25-FFE0-834CFA97481A}"/>
               </a:ext>
             </a:extLst>
           </p:cNvPr>
@@ -5313,10 +5313,10 @@
           <p:cNvPr id="108" name="Rectangle 107">
             <a:extLst>
               <a:ext uri="{FF2B5EF4-FFF2-40B4-BE49-F238E27FC236}">
-                <a16:creationId xmlns:a16="http://schemas.microsoft.com/office/drawing/2014/main" id="{E6995CE5-F890-4ABA-82A2-26507CE8D2A3}"/>
+                <a16:creationId xmlns:a16="http://schemas.microsoft.com/office/drawing/2014/main" xmlns="" id="{E6995CE5-F890-4ABA-82A2-26507CE8D2A3}"/>
               </a:ext>
               <a:ext uri="{C183D7F6-B498-43B3-948B-1728B52AA6E4}">
-                <adec:decorative xmlns:adec="http://schemas.microsoft.com/office/drawing/2017/decorative" val="1"/>
+                <adec:decorative xmlns:adec="http://schemas.microsoft.com/office/drawing/2017/decorative" xmlns="" val="1"/>
               </a:ext>
             </a:extLst>
           </p:cNvPr>
@@ -5326,7 +5326,7 @@
           <p:nvPr>
             <p:extLst>
               <p:ext uri="{386F3935-93C4-4BCD-93E2-E3B085C9AB24}">
-                <p16:designElem xmlns:p16="http://schemas.microsoft.com/office/powerpoint/2015/main" val="1"/>
+                <p16:designElem xmlns:p16="http://schemas.microsoft.com/office/powerpoint/2015/main" xmlns="" val="1"/>
               </p:ext>
             </p:extLst>
           </p:nvPr>
@@ -5376,7 +5376,7 @@
           <p:cNvPr id="4" name="Slide Number Placeholder 3">
             <a:extLst>
               <a:ext uri="{FF2B5EF4-FFF2-40B4-BE49-F238E27FC236}">
-                <a16:creationId xmlns:a16="http://schemas.microsoft.com/office/drawing/2014/main" id="{BB9F544D-32FE-4214-374D-8F089E72BF98}"/>
+                <a16:creationId xmlns:a16="http://schemas.microsoft.com/office/drawing/2014/main" xmlns="" id="{BB9F544D-32FE-4214-374D-8F089E72BF98}"/>
               </a:ext>
             </a:extLst>
           </p:cNvPr>
@@ -5446,7 +5446,7 @@
     <a:masterClrMapping/>
   </p:clrMapOvr>
   <mc:AlternateContent xmlns:mc="http://schemas.openxmlformats.org/markup-compatibility/2006">
-    <mc:Choice xmlns:p159="http://schemas.microsoft.com/office/powerpoint/2015/09/main" Requires="p159">
+    <mc:Choice xmlns:p159="http://schemas.microsoft.com/office/powerpoint/2015/09/main" xmlns="" Requires="p159">
       <p:transition xmlns:p14="http://schemas.microsoft.com/office/powerpoint/2010/main" spd="slow" p14:dur="2000">
         <p159:morph option="byObject"/>
       </p:transition>
@@ -5490,10 +5490,10 @@
           <p:cNvPr id="10" name="Rectangle 9">
             <a:extLst>
               <a:ext uri="{FF2B5EF4-FFF2-40B4-BE49-F238E27FC236}">
-                <a16:creationId xmlns:a16="http://schemas.microsoft.com/office/drawing/2014/main" id="{100EDD19-6802-4EC3-95CE-CFFAB042CFD6}"/>
+                <a16:creationId xmlns:a16="http://schemas.microsoft.com/office/drawing/2014/main" xmlns="" id="{100EDD19-6802-4EC3-95CE-CFFAB042CFD6}"/>
               </a:ext>
               <a:ext uri="{C183D7F6-B498-43B3-948B-1728B52AA6E4}">
-                <adec:decorative xmlns:adec="http://schemas.microsoft.com/office/drawing/2017/decorative" val="1"/>
+                <adec:decorative xmlns:adec="http://schemas.microsoft.com/office/drawing/2017/decorative" xmlns="" val="1"/>
               </a:ext>
             </a:extLst>
           </p:cNvPr>
@@ -5503,7 +5503,7 @@
           <p:nvPr>
             <p:extLst>
               <p:ext uri="{386F3935-93C4-4BCD-93E2-E3B085C9AB24}">
-                <p16:designElem xmlns:p16="http://schemas.microsoft.com/office/powerpoint/2015/main" val="1"/>
+                <p16:designElem xmlns:p16="http://schemas.microsoft.com/office/powerpoint/2015/main" xmlns="" val="1"/>
               </p:ext>
             </p:extLst>
           </p:nvPr>
@@ -5550,7 +5550,7 @@
           <p:cNvPr id="2" name="Title 1">
             <a:extLst>
               <a:ext uri="{FF2B5EF4-FFF2-40B4-BE49-F238E27FC236}">
-                <a16:creationId xmlns:a16="http://schemas.microsoft.com/office/drawing/2014/main" id="{67C80B98-4B19-F431-A878-AC3855E470F3}"/>
+                <a16:creationId xmlns:a16="http://schemas.microsoft.com/office/drawing/2014/main" xmlns="" id="{67C80B98-4B19-F431-A878-AC3855E470F3}"/>
               </a:ext>
             </a:extLst>
           </p:cNvPr>
@@ -5591,10 +5591,10 @@
           <p:cNvPr id="12" name="sketch line">
             <a:extLst>
               <a:ext uri="{FF2B5EF4-FFF2-40B4-BE49-F238E27FC236}">
-                <a16:creationId xmlns:a16="http://schemas.microsoft.com/office/drawing/2014/main" id="{DB17E863-922E-4C26-BD64-E8FD41D28661}"/>
+                <a16:creationId xmlns:a16="http://schemas.microsoft.com/office/drawing/2014/main" xmlns="" id="{DB17E863-922E-4C26-BD64-E8FD41D28661}"/>
               </a:ext>
               <a:ext uri="{C183D7F6-B498-43B3-948B-1728B52AA6E4}">
-                <adec:decorative xmlns:adec="http://schemas.microsoft.com/office/drawing/2017/decorative" val="1"/>
+                <adec:decorative xmlns:adec="http://schemas.microsoft.com/office/drawing/2017/decorative" xmlns="" val="1"/>
               </a:ext>
             </a:extLst>
           </p:cNvPr>
@@ -5604,7 +5604,7 @@
           <p:nvPr>
             <p:extLst>
               <p:ext uri="{386F3935-93C4-4BCD-93E2-E3B085C9AB24}">
-                <p16:designElem xmlns:p16="http://schemas.microsoft.com/office/powerpoint/2015/main" val="1"/>
+                <p16:designElem xmlns:p16="http://schemas.microsoft.com/office/powerpoint/2015/main" xmlns="" val="1"/>
               </p:ext>
             </p:extLst>
           </p:nvPr>
@@ -6187,7 +6187,7 @@
             <a:round/>
             <a:extLst>
               <a:ext uri="{C807C97D-BFC1-408E-A445-0C87EB9F89A2}">
-                <ask:lineSketchStyleProps xmlns:ask="http://schemas.microsoft.com/office/drawing/2018/sketchyshapes" sd="1219033472">
+                <ask:lineSketchStyleProps xmlns:ask="http://schemas.microsoft.com/office/drawing/2018/sketchyshapes" xmlns="" sd="1219033472">
                   <a:prstGeom prst="rect">
                     <a:avLst/>
                   </a:prstGeom>
@@ -6229,7 +6229,7 @@
           <p:cNvPr id="3" name="Text Placeholder 2">
             <a:extLst>
               <a:ext uri="{FF2B5EF4-FFF2-40B4-BE49-F238E27FC236}">
-                <a16:creationId xmlns:a16="http://schemas.microsoft.com/office/drawing/2014/main" id="{5CFB902F-05CC-0DEC-2904-1284DA9CC60A}"/>
+                <a16:creationId xmlns:a16="http://schemas.microsoft.com/office/drawing/2014/main" xmlns="" id="{5CFB902F-05CC-0DEC-2904-1284DA9CC60A}"/>
               </a:ext>
             </a:extLst>
           </p:cNvPr>
@@ -6287,7 +6287,7 @@
           <p:cNvPr id="4" name="Slide Number Placeholder 3">
             <a:extLst>
               <a:ext uri="{FF2B5EF4-FFF2-40B4-BE49-F238E27FC236}">
-                <a16:creationId xmlns:a16="http://schemas.microsoft.com/office/drawing/2014/main" id="{BB9F544D-32FE-4214-374D-8F089E72BF98}"/>
+                <a16:creationId xmlns:a16="http://schemas.microsoft.com/office/drawing/2014/main" xmlns="" id="{BB9F544D-32FE-4214-374D-8F089E72BF98}"/>
               </a:ext>
             </a:extLst>
           </p:cNvPr>
@@ -6355,7 +6355,7 @@
     <a:masterClrMapping/>
   </p:clrMapOvr>
   <mc:AlternateContent xmlns:mc="http://schemas.openxmlformats.org/markup-compatibility/2006">
-    <mc:Choice xmlns:p159="http://schemas.microsoft.com/office/powerpoint/2015/09/main" Requires="p159">
+    <mc:Choice xmlns:p159="http://schemas.microsoft.com/office/powerpoint/2015/09/main" xmlns="" Requires="p159">
       <p:transition xmlns:p14="http://schemas.microsoft.com/office/powerpoint/2010/main" spd="slow" p14:dur="2000">
         <p159:morph option="byObject"/>
       </p:transition>
@@ -6399,10 +6399,10 @@
           <p:cNvPr id="8" name="Rectangle 7">
             <a:extLst>
               <a:ext uri="{FF2B5EF4-FFF2-40B4-BE49-F238E27FC236}">
-                <a16:creationId xmlns:a16="http://schemas.microsoft.com/office/drawing/2014/main" id="{100EDD19-6802-4EC3-95CE-CFFAB042CFD6}"/>
+                <a16:creationId xmlns:a16="http://schemas.microsoft.com/office/drawing/2014/main" xmlns="" id="{100EDD19-6802-4EC3-95CE-CFFAB042CFD6}"/>
               </a:ext>
               <a:ext uri="{C183D7F6-B498-43B3-948B-1728B52AA6E4}">
-                <adec:decorative xmlns:adec="http://schemas.microsoft.com/office/drawing/2017/decorative" val="1"/>
+                <adec:decorative xmlns:adec="http://schemas.microsoft.com/office/drawing/2017/decorative" xmlns="" val="1"/>
               </a:ext>
             </a:extLst>
           </p:cNvPr>
@@ -6412,7 +6412,7 @@
           <p:nvPr>
             <p:extLst>
               <p:ext uri="{386F3935-93C4-4BCD-93E2-E3B085C9AB24}">
-                <p16:designElem xmlns:p16="http://schemas.microsoft.com/office/powerpoint/2015/main" val="1"/>
+                <p16:designElem xmlns:p16="http://schemas.microsoft.com/office/powerpoint/2015/main" xmlns="" val="1"/>
               </p:ext>
             </p:extLst>
           </p:nvPr>
@@ -6459,7 +6459,7 @@
           <p:cNvPr id="2" name="Title 1">
             <a:extLst>
               <a:ext uri="{FF2B5EF4-FFF2-40B4-BE49-F238E27FC236}">
-                <a16:creationId xmlns:a16="http://schemas.microsoft.com/office/drawing/2014/main" id="{9663EAA8-3E18-CCEE-1756-E4204B6B13F4}"/>
+                <a16:creationId xmlns:a16="http://schemas.microsoft.com/office/drawing/2014/main" xmlns="" id="{9663EAA8-3E18-CCEE-1756-E4204B6B13F4}"/>
               </a:ext>
             </a:extLst>
           </p:cNvPr>
@@ -6500,10 +6500,10 @@
           <p:cNvPr id="10" name="sketch line">
             <a:extLst>
               <a:ext uri="{FF2B5EF4-FFF2-40B4-BE49-F238E27FC236}">
-                <a16:creationId xmlns:a16="http://schemas.microsoft.com/office/drawing/2014/main" id="{DB17E863-922E-4C26-BD64-E8FD41D28661}"/>
+                <a16:creationId xmlns:a16="http://schemas.microsoft.com/office/drawing/2014/main" xmlns="" id="{DB17E863-922E-4C26-BD64-E8FD41D28661}"/>
               </a:ext>
               <a:ext uri="{C183D7F6-B498-43B3-948B-1728B52AA6E4}">
-                <adec:decorative xmlns:adec="http://schemas.microsoft.com/office/drawing/2017/decorative" val="1"/>
+                <adec:decorative xmlns:adec="http://schemas.microsoft.com/office/drawing/2017/decorative" xmlns="" val="1"/>
               </a:ext>
             </a:extLst>
           </p:cNvPr>
@@ -6513,7 +6513,7 @@
           <p:nvPr>
             <p:extLst>
               <p:ext uri="{386F3935-93C4-4BCD-93E2-E3B085C9AB24}">
-                <p16:designElem xmlns:p16="http://schemas.microsoft.com/office/powerpoint/2015/main" val="1"/>
+                <p16:designElem xmlns:p16="http://schemas.microsoft.com/office/powerpoint/2015/main" xmlns="" val="1"/>
               </p:ext>
             </p:extLst>
           </p:nvPr>
@@ -7096,7 +7096,7 @@
             <a:round/>
             <a:extLst>
               <a:ext uri="{C807C97D-BFC1-408E-A445-0C87EB9F89A2}">
-                <ask:lineSketchStyleProps xmlns:ask="http://schemas.microsoft.com/office/drawing/2018/sketchyshapes" sd="1219033472">
+                <ask:lineSketchStyleProps xmlns:ask="http://schemas.microsoft.com/office/drawing/2018/sketchyshapes" xmlns="" sd="1219033472">
                   <a:prstGeom prst="rect">
                     <a:avLst/>
                   </a:prstGeom>
@@ -7138,7 +7138,7 @@
           <p:cNvPr id="3" name="Text Placeholder 2">
             <a:extLst>
               <a:ext uri="{FF2B5EF4-FFF2-40B4-BE49-F238E27FC236}">
-                <a16:creationId xmlns:a16="http://schemas.microsoft.com/office/drawing/2014/main" id="{291A0612-0C59-8B87-5C30-3514C06476D1}"/>
+                <a16:creationId xmlns:a16="http://schemas.microsoft.com/office/drawing/2014/main" xmlns="" id="{291A0612-0C59-8B87-5C30-3514C06476D1}"/>
               </a:ext>
             </a:extLst>
           </p:cNvPr>
@@ -7237,7 +7237,7 @@
           <p:cNvPr id="4" name="Slide Number Placeholder 3">
             <a:extLst>
               <a:ext uri="{FF2B5EF4-FFF2-40B4-BE49-F238E27FC236}">
-                <a16:creationId xmlns:a16="http://schemas.microsoft.com/office/drawing/2014/main" id="{33AC2A12-3DAF-4420-74F0-7D9269B68D71}"/>
+                <a16:creationId xmlns:a16="http://schemas.microsoft.com/office/drawing/2014/main" xmlns="" id="{33AC2A12-3DAF-4420-74F0-7D9269B68D71}"/>
               </a:ext>
             </a:extLst>
           </p:cNvPr>
@@ -7305,7 +7305,7 @@
     <a:masterClrMapping/>
   </p:clrMapOvr>
   <mc:AlternateContent xmlns:mc="http://schemas.openxmlformats.org/markup-compatibility/2006">
-    <mc:Choice xmlns:p159="http://schemas.microsoft.com/office/powerpoint/2015/09/main" Requires="p159">
+    <mc:Choice xmlns:p159="http://schemas.microsoft.com/office/powerpoint/2015/09/main" xmlns="" Requires="p159">
       <p:transition xmlns:p14="http://schemas.microsoft.com/office/powerpoint/2010/main" spd="slow" p14:dur="2000">
         <p159:morph option="byObject"/>
       </p:transition>
@@ -7349,10 +7349,10 @@
           <p:cNvPr id="15" name="Rectangle 14">
             <a:extLst>
               <a:ext uri="{FF2B5EF4-FFF2-40B4-BE49-F238E27FC236}">
-                <a16:creationId xmlns:a16="http://schemas.microsoft.com/office/drawing/2014/main" id="{B1595A09-E336-4D1B-9B3A-06A2287A54E2}"/>
+                <a16:creationId xmlns:a16="http://schemas.microsoft.com/office/drawing/2014/main" xmlns="" id="{B1595A09-E336-4D1B-9B3A-06A2287A54E2}"/>
               </a:ext>
               <a:ext uri="{C183D7F6-B498-43B3-948B-1728B52AA6E4}">
-                <adec:decorative xmlns:adec="http://schemas.microsoft.com/office/drawing/2017/decorative" val="1"/>
+                <adec:decorative xmlns:adec="http://schemas.microsoft.com/office/drawing/2017/decorative" xmlns="" val="1"/>
               </a:ext>
             </a:extLst>
           </p:cNvPr>
@@ -7362,7 +7362,7 @@
           <p:nvPr>
             <p:extLst>
               <p:ext uri="{386F3935-93C4-4BCD-93E2-E3B085C9AB24}">
-                <p16:designElem xmlns:p16="http://schemas.microsoft.com/office/powerpoint/2015/main" val="1"/>
+                <p16:designElem xmlns:p16="http://schemas.microsoft.com/office/powerpoint/2015/main" xmlns="" val="1"/>
               </p:ext>
             </p:extLst>
           </p:nvPr>
@@ -7409,7 +7409,7 @@
           <p:cNvPr id="2" name="Title 1">
             <a:extLst>
               <a:ext uri="{FF2B5EF4-FFF2-40B4-BE49-F238E27FC236}">
-                <a16:creationId xmlns:a16="http://schemas.microsoft.com/office/drawing/2014/main" id="{9663EAA8-3E18-CCEE-1756-E4204B6B13F4}"/>
+                <a16:creationId xmlns:a16="http://schemas.microsoft.com/office/drawing/2014/main" xmlns="" id="{9663EAA8-3E18-CCEE-1756-E4204B6B13F4}"/>
               </a:ext>
             </a:extLst>
           </p:cNvPr>
@@ -7448,7 +7448,7 @@
           <p:cNvPr id="5" name="Picture 4" descr="A screenshot of a computer program&#10;&#10;Description automatically generated">
             <a:extLst>
               <a:ext uri="{FF2B5EF4-FFF2-40B4-BE49-F238E27FC236}">
-                <a16:creationId xmlns:a16="http://schemas.microsoft.com/office/drawing/2014/main" id="{FB1F5B9B-763A-C5C1-2CCC-05775D7A9A44}"/>
+                <a16:creationId xmlns:a16="http://schemas.microsoft.com/office/drawing/2014/main" xmlns="" id="{FB1F5B9B-763A-C5C1-2CCC-05775D7A9A44}"/>
               </a:ext>
             </a:extLst>
           </p:cNvPr>
@@ -7707,10 +7707,10 @@
           <p:cNvPr id="16" name="sketch line">
             <a:extLst>
               <a:ext uri="{FF2B5EF4-FFF2-40B4-BE49-F238E27FC236}">
-                <a16:creationId xmlns:a16="http://schemas.microsoft.com/office/drawing/2014/main" id="{3540989C-C7B8-473B-BF87-6F2DA6A90006}"/>
+                <a16:creationId xmlns:a16="http://schemas.microsoft.com/office/drawing/2014/main" xmlns="" id="{3540989C-C7B8-473B-BF87-6F2DA6A90006}"/>
               </a:ext>
               <a:ext uri="{C183D7F6-B498-43B3-948B-1728B52AA6E4}">
-                <adec:decorative xmlns:adec="http://schemas.microsoft.com/office/drawing/2017/decorative" val="1"/>
+                <adec:decorative xmlns:adec="http://schemas.microsoft.com/office/drawing/2017/decorative" xmlns="" val="1"/>
               </a:ext>
             </a:extLst>
           </p:cNvPr>
@@ -7720,7 +7720,7 @@
           <p:nvPr>
             <p:extLst>
               <p:ext uri="{386F3935-93C4-4BCD-93E2-E3B085C9AB24}">
-                <p16:designElem xmlns:p16="http://schemas.microsoft.com/office/powerpoint/2015/main" val="1"/>
+                <p16:designElem xmlns:p16="http://schemas.microsoft.com/office/powerpoint/2015/main" xmlns="" val="1"/>
               </p:ext>
             </p:extLst>
           </p:nvPr>
@@ -7858,7 +7858,7 @@
             <a:round/>
             <a:extLst>
               <a:ext uri="{C807C97D-BFC1-408E-A445-0C87EB9F89A2}">
-                <ask:lineSketchStyleProps xmlns:ask="http://schemas.microsoft.com/office/drawing/2018/sketchyshapes" sd="615697673">
+                <ask:lineSketchStyleProps xmlns:ask="http://schemas.microsoft.com/office/drawing/2018/sketchyshapes" xmlns="" sd="615697673">
                   <a:prstGeom prst="rect">
                     <a:avLst/>
                   </a:prstGeom>
@@ -7900,7 +7900,7 @@
           <p:cNvPr id="3" name="Text Placeholder 2">
             <a:extLst>
               <a:ext uri="{FF2B5EF4-FFF2-40B4-BE49-F238E27FC236}">
-                <a16:creationId xmlns:a16="http://schemas.microsoft.com/office/drawing/2014/main" id="{291A0612-0C59-8B87-5C30-3514C06476D1}"/>
+                <a16:creationId xmlns:a16="http://schemas.microsoft.com/office/drawing/2014/main" xmlns="" id="{291A0612-0C59-8B87-5C30-3514C06476D1}"/>
               </a:ext>
             </a:extLst>
           </p:cNvPr>
@@ -8092,7 +8092,7 @@
           <p:cNvPr id="4" name="Slide Number Placeholder 3">
             <a:extLst>
               <a:ext uri="{FF2B5EF4-FFF2-40B4-BE49-F238E27FC236}">
-                <a16:creationId xmlns:a16="http://schemas.microsoft.com/office/drawing/2014/main" id="{33AC2A12-3DAF-4420-74F0-7D9269B68D71}"/>
+                <a16:creationId xmlns:a16="http://schemas.microsoft.com/office/drawing/2014/main" xmlns="" id="{33AC2A12-3DAF-4420-74F0-7D9269B68D71}"/>
               </a:ext>
             </a:extLst>
           </p:cNvPr>
@@ -8162,7 +8162,7 @@
     <a:masterClrMapping/>
   </p:clrMapOvr>
   <mc:AlternateContent xmlns:mc="http://schemas.openxmlformats.org/markup-compatibility/2006">
-    <mc:Choice xmlns:p159="http://schemas.microsoft.com/office/powerpoint/2015/09/main" Requires="p159">
+    <mc:Choice xmlns:p159="http://schemas.microsoft.com/office/powerpoint/2015/09/main" xmlns="" Requires="p159">
       <p:transition xmlns:p14="http://schemas.microsoft.com/office/powerpoint/2010/main" spd="slow" p14:dur="2000">
         <p159:morph option="byObject"/>
       </p:transition>
@@ -8206,10 +8206,10 @@
           <p:cNvPr id="6" name="Rectangle 5">
             <a:extLst>
               <a:ext uri="{FF2B5EF4-FFF2-40B4-BE49-F238E27FC236}">
-                <a16:creationId xmlns:a16="http://schemas.microsoft.com/office/drawing/2014/main" id="{100EDD19-6802-4EC3-95CE-CFFAB042CFD6}"/>
+                <a16:creationId xmlns:a16="http://schemas.microsoft.com/office/drawing/2014/main" xmlns="" id="{100EDD19-6802-4EC3-95CE-CFFAB042CFD6}"/>
               </a:ext>
               <a:ext uri="{C183D7F6-B498-43B3-948B-1728B52AA6E4}">
-                <adec:decorative xmlns:adec="http://schemas.microsoft.com/office/drawing/2017/decorative" val="1"/>
+                <adec:decorative xmlns:adec="http://schemas.microsoft.com/office/drawing/2017/decorative" xmlns="" val="1"/>
               </a:ext>
             </a:extLst>
           </p:cNvPr>
@@ -8219,7 +8219,7 @@
           <p:nvPr>
             <p:extLst>
               <p:ext uri="{386F3935-93C4-4BCD-93E2-E3B085C9AB24}">
-                <p16:designElem xmlns:p16="http://schemas.microsoft.com/office/powerpoint/2015/main" val="1"/>
+                <p16:designElem xmlns:p16="http://schemas.microsoft.com/office/powerpoint/2015/main" xmlns="" val="1"/>
               </p:ext>
             </p:extLst>
           </p:nvPr>
@@ -8266,7 +8266,7 @@
           <p:cNvPr id="2" name="Title 1">
             <a:extLst>
               <a:ext uri="{FF2B5EF4-FFF2-40B4-BE49-F238E27FC236}">
-                <a16:creationId xmlns:a16="http://schemas.microsoft.com/office/drawing/2014/main" id="{1343A18C-BF5B-47F5-6708-CFDAF71B512E}"/>
+                <a16:creationId xmlns:a16="http://schemas.microsoft.com/office/drawing/2014/main" xmlns="" id="{1343A18C-BF5B-47F5-6708-CFDAF71B512E}"/>
               </a:ext>
             </a:extLst>
           </p:cNvPr>
@@ -8308,10 +8308,10 @@
           <p:cNvPr id="7" name="sketch line">
             <a:extLst>
               <a:ext uri="{FF2B5EF4-FFF2-40B4-BE49-F238E27FC236}">
-                <a16:creationId xmlns:a16="http://schemas.microsoft.com/office/drawing/2014/main" id="{DB17E863-922E-4C26-BD64-E8FD41D28661}"/>
+                <a16:creationId xmlns:a16="http://schemas.microsoft.com/office/drawing/2014/main" xmlns="" id="{DB17E863-922E-4C26-BD64-E8FD41D28661}"/>
               </a:ext>
               <a:ext uri="{C183D7F6-B498-43B3-948B-1728B52AA6E4}">
-                <adec:decorative xmlns:adec="http://schemas.microsoft.com/office/drawing/2017/decorative" val="1"/>
+                <adec:decorative xmlns:adec="http://schemas.microsoft.com/office/drawing/2017/decorative" xmlns="" val="1"/>
               </a:ext>
             </a:extLst>
           </p:cNvPr>
@@ -8321,7 +8321,7 @@
           <p:nvPr>
             <p:extLst>
               <p:ext uri="{386F3935-93C4-4BCD-93E2-E3B085C9AB24}">
-                <p16:designElem xmlns:p16="http://schemas.microsoft.com/office/powerpoint/2015/main" val="1"/>
+                <p16:designElem xmlns:p16="http://schemas.microsoft.com/office/powerpoint/2015/main" xmlns="" val="1"/>
               </p:ext>
             </p:extLst>
           </p:nvPr>
@@ -8904,7 +8904,7 @@
             <a:round/>
             <a:extLst>
               <a:ext uri="{C807C97D-BFC1-408E-A445-0C87EB9F89A2}">
-                <ask:lineSketchStyleProps xmlns:ask="http://schemas.microsoft.com/office/drawing/2018/sketchyshapes" sd="1219033472">
+                <ask:lineSketchStyleProps xmlns:ask="http://schemas.microsoft.com/office/drawing/2018/sketchyshapes" xmlns="" sd="1219033472">
                   <a:prstGeom prst="rect">
                     <a:avLst/>
                   </a:prstGeom>
@@ -8946,7 +8946,7 @@
           <p:cNvPr id="3" name="Text Placeholder 2">
             <a:extLst>
               <a:ext uri="{FF2B5EF4-FFF2-40B4-BE49-F238E27FC236}">
-                <a16:creationId xmlns:a16="http://schemas.microsoft.com/office/drawing/2014/main" id="{251F21F8-7FB0-10CD-8A9E-EBB679355FEE}"/>
+                <a16:creationId xmlns:a16="http://schemas.microsoft.com/office/drawing/2014/main" xmlns="" id="{251F21F8-7FB0-10CD-8A9E-EBB679355FEE}"/>
               </a:ext>
             </a:extLst>
           </p:cNvPr>
@@ -9044,7 +9044,7 @@
           <p:cNvPr id="4" name="Slide Number Placeholder 3">
             <a:extLst>
               <a:ext uri="{FF2B5EF4-FFF2-40B4-BE49-F238E27FC236}">
-                <a16:creationId xmlns:a16="http://schemas.microsoft.com/office/drawing/2014/main" id="{EB88336F-C0D8-AD24-55CC-33CC1FB87B05}"/>
+                <a16:creationId xmlns:a16="http://schemas.microsoft.com/office/drawing/2014/main" xmlns="" id="{EB88336F-C0D8-AD24-55CC-33CC1FB87B05}"/>
               </a:ext>
             </a:extLst>
           </p:cNvPr>
@@ -9112,7 +9112,7 @@
     <a:masterClrMapping/>
   </p:clrMapOvr>
   <mc:AlternateContent xmlns:mc="http://schemas.openxmlformats.org/markup-compatibility/2006">
-    <mc:Choice xmlns:p159="http://schemas.microsoft.com/office/powerpoint/2015/09/main" Requires="p159">
+    <mc:Choice xmlns:p159="http://schemas.microsoft.com/office/powerpoint/2015/09/main" xmlns="" Requires="p159">
       <p:transition xmlns:p14="http://schemas.microsoft.com/office/powerpoint/2010/main" spd="slow" p14:dur="2000">
         <p159:morph option="byObject"/>
       </p:transition>
@@ -9156,10 +9156,10 @@
           <p:cNvPr id="6" name="Rectangle 5">
             <a:extLst>
               <a:ext uri="{FF2B5EF4-FFF2-40B4-BE49-F238E27FC236}">
-                <a16:creationId xmlns:a16="http://schemas.microsoft.com/office/drawing/2014/main" id="{100EDD19-6802-4EC3-95CE-CFFAB042CFD6}"/>
+                <a16:creationId xmlns:a16="http://schemas.microsoft.com/office/drawing/2014/main" xmlns="" id="{100EDD19-6802-4EC3-95CE-CFFAB042CFD6}"/>
               </a:ext>
               <a:ext uri="{C183D7F6-B498-43B3-948B-1728B52AA6E4}">
-                <adec:decorative xmlns:adec="http://schemas.microsoft.com/office/drawing/2017/decorative" val="1"/>
+                <adec:decorative xmlns:adec="http://schemas.microsoft.com/office/drawing/2017/decorative" xmlns="" val="1"/>
               </a:ext>
             </a:extLst>
           </p:cNvPr>
@@ -9169,7 +9169,7 @@
           <p:nvPr>
             <p:extLst>
               <p:ext uri="{386F3935-93C4-4BCD-93E2-E3B085C9AB24}">
-                <p16:designElem xmlns:p16="http://schemas.microsoft.com/office/powerpoint/2015/main" val="1"/>
+                <p16:designElem xmlns:p16="http://schemas.microsoft.com/office/powerpoint/2015/main" xmlns="" val="1"/>
               </p:ext>
             </p:extLst>
           </p:nvPr>
@@ -9216,7 +9216,7 @@
           <p:cNvPr id="2" name="Title 1">
             <a:extLst>
               <a:ext uri="{FF2B5EF4-FFF2-40B4-BE49-F238E27FC236}">
-                <a16:creationId xmlns:a16="http://schemas.microsoft.com/office/drawing/2014/main" id="{27CF3C97-3D89-D75E-DC31-E7631A23FC0F}"/>
+                <a16:creationId xmlns:a16="http://schemas.microsoft.com/office/drawing/2014/main" xmlns="" id="{27CF3C97-3D89-D75E-DC31-E7631A23FC0F}"/>
               </a:ext>
             </a:extLst>
           </p:cNvPr>
@@ -9257,10 +9257,10 @@
           <p:cNvPr id="7" name="sketch line">
             <a:extLst>
               <a:ext uri="{FF2B5EF4-FFF2-40B4-BE49-F238E27FC236}">
-                <a16:creationId xmlns:a16="http://schemas.microsoft.com/office/drawing/2014/main" id="{DB17E863-922E-4C26-BD64-E8FD41D28661}"/>
+                <a16:creationId xmlns:a16="http://schemas.microsoft.com/office/drawing/2014/main" xmlns="" id="{DB17E863-922E-4C26-BD64-E8FD41D28661}"/>
               </a:ext>
               <a:ext uri="{C183D7F6-B498-43B3-948B-1728B52AA6E4}">
-                <adec:decorative xmlns:adec="http://schemas.microsoft.com/office/drawing/2017/decorative" val="1"/>
+                <adec:decorative xmlns:adec="http://schemas.microsoft.com/office/drawing/2017/decorative" xmlns="" val="1"/>
               </a:ext>
             </a:extLst>
           </p:cNvPr>
@@ -9270,7 +9270,7 @@
           <p:nvPr>
             <p:extLst>
               <p:ext uri="{386F3935-93C4-4BCD-93E2-E3B085C9AB24}">
-                <p16:designElem xmlns:p16="http://schemas.microsoft.com/office/powerpoint/2015/main" val="1"/>
+                <p16:designElem xmlns:p16="http://schemas.microsoft.com/office/powerpoint/2015/main" xmlns="" val="1"/>
               </p:ext>
             </p:extLst>
           </p:nvPr>
@@ -9853,7 +9853,7 @@
             <a:round/>
             <a:extLst>
               <a:ext uri="{C807C97D-BFC1-408E-A445-0C87EB9F89A2}">
-                <ask:lineSketchStyleProps xmlns:ask="http://schemas.microsoft.com/office/drawing/2018/sketchyshapes" sd="1219033472">
+                <ask:lineSketchStyleProps xmlns:ask="http://schemas.microsoft.com/office/drawing/2018/sketchyshapes" xmlns="" sd="1219033472">
                   <a:prstGeom prst="rect">
                     <a:avLst/>
                   </a:prstGeom>
@@ -9895,7 +9895,7 @@
           <p:cNvPr id="3" name="Text Placeholder 2">
             <a:extLst>
               <a:ext uri="{FF2B5EF4-FFF2-40B4-BE49-F238E27FC236}">
-                <a16:creationId xmlns:a16="http://schemas.microsoft.com/office/drawing/2014/main" id="{87354606-F72D-20D5-93C3-171CF22852C0}"/>
+                <a16:creationId xmlns:a16="http://schemas.microsoft.com/office/drawing/2014/main" xmlns="" id="{87354606-F72D-20D5-93C3-171CF22852C0}"/>
               </a:ext>
             </a:extLst>
           </p:cNvPr>
@@ -9967,7 +9967,7 @@
           <p:cNvPr id="4" name="Slide Number Placeholder 3">
             <a:extLst>
               <a:ext uri="{FF2B5EF4-FFF2-40B4-BE49-F238E27FC236}">
-                <a16:creationId xmlns:a16="http://schemas.microsoft.com/office/drawing/2014/main" id="{4CAFFE88-31D9-0A82-6188-B6D1F63514DA}"/>
+                <a16:creationId xmlns:a16="http://schemas.microsoft.com/office/drawing/2014/main" xmlns="" id="{4CAFFE88-31D9-0A82-6188-B6D1F63514DA}"/>
               </a:ext>
             </a:extLst>
           </p:cNvPr>
@@ -10035,7 +10035,7 @@
     <a:masterClrMapping/>
   </p:clrMapOvr>
   <mc:AlternateContent xmlns:mc="http://schemas.openxmlformats.org/markup-compatibility/2006">
-    <mc:Choice xmlns:p159="http://schemas.microsoft.com/office/powerpoint/2015/09/main" Requires="p159">
+    <mc:Choice xmlns:p159="http://schemas.microsoft.com/office/powerpoint/2015/09/main" xmlns="" Requires="p159">
       <p:transition xmlns:p14="http://schemas.microsoft.com/office/powerpoint/2010/main" spd="slow" p14:dur="2000">
         <p159:morph option="byObject"/>
       </p:transition>
@@ -10046,6 +10046,13 @@
       </p:transition>
     </mc:Fallback>
   </mc:AlternateContent>
+  <p:timing>
+    <p:tnLst>
+      <p:par>
+        <p:cTn id="1" dur="indefinite" restart="never" nodeType="tmRoot"/>
+      </p:par>
+    </p:tnLst>
+  </p:timing>
 </p:sld>
 </file>
 
@@ -10079,10 +10086,10 @@
           <p:cNvPr id="12" name="Rectangle 11">
             <a:extLst>
               <a:ext uri="{FF2B5EF4-FFF2-40B4-BE49-F238E27FC236}">
-                <a16:creationId xmlns:a16="http://schemas.microsoft.com/office/drawing/2014/main" id="{86FF76B9-219D-4469-AF87-0236D29032F1}"/>
+                <a16:creationId xmlns:a16="http://schemas.microsoft.com/office/drawing/2014/main" xmlns="" id="{86FF76B9-219D-4469-AF87-0236D29032F1}"/>
               </a:ext>
               <a:ext uri="{C183D7F6-B498-43B3-948B-1728B52AA6E4}">
-                <adec:decorative xmlns:adec="http://schemas.microsoft.com/office/drawing/2017/decorative" val="1"/>
+                <adec:decorative xmlns:adec="http://schemas.microsoft.com/office/drawing/2017/decorative" xmlns="" val="1"/>
               </a:ext>
             </a:extLst>
           </p:cNvPr>
@@ -10092,7 +10099,7 @@
           <p:nvPr>
             <p:extLst>
               <p:ext uri="{386F3935-93C4-4BCD-93E2-E3B085C9AB24}">
-                <p16:designElem xmlns:p16="http://schemas.microsoft.com/office/powerpoint/2015/main" val="1"/>
+                <p16:designElem xmlns:p16="http://schemas.microsoft.com/office/powerpoint/2015/main" xmlns="" val="1"/>
               </p:ext>
             </p:extLst>
           </p:nvPr>
@@ -10142,10 +10149,10 @@
           <p:cNvPr id="14" name="Group 13">
             <a:extLst>
               <a:ext uri="{FF2B5EF4-FFF2-40B4-BE49-F238E27FC236}">
-                <a16:creationId xmlns:a16="http://schemas.microsoft.com/office/drawing/2014/main" id="{DB88BD78-87E1-424D-B479-C37D8E41B12E}"/>
+                <a16:creationId xmlns:a16="http://schemas.microsoft.com/office/drawing/2014/main" xmlns="" id="{DB88BD78-87E1-424D-B479-C37D8E41B12E}"/>
               </a:ext>
               <a:ext uri="{C183D7F6-B498-43B3-948B-1728B52AA6E4}">
-                <adec:decorative xmlns:adec="http://schemas.microsoft.com/office/drawing/2017/decorative" val="1"/>
+                <adec:decorative xmlns:adec="http://schemas.microsoft.com/office/drawing/2017/decorative" xmlns="" val="1"/>
               </a:ext>
             </a:extLst>
           </p:cNvPr>
@@ -10155,7 +10162,7 @@
           <p:nvPr>
             <p:extLst>
               <p:ext uri="{386F3935-93C4-4BCD-93E2-E3B085C9AB24}">
-                <p16:designElem xmlns:p16="http://schemas.microsoft.com/office/powerpoint/2015/main" val="1"/>
+                <p16:designElem xmlns:p16="http://schemas.microsoft.com/office/powerpoint/2015/main" xmlns="" val="1"/>
               </p:ext>
             </p:extLst>
           </p:nvPr>
@@ -10173,10 +10180,10 @@
             <p:cNvPr id="15" name="Freeform: Shape 14">
               <a:extLst>
                 <a:ext uri="{FF2B5EF4-FFF2-40B4-BE49-F238E27FC236}">
-                  <a16:creationId xmlns:a16="http://schemas.microsoft.com/office/drawing/2014/main" id="{C05EB894-9410-4B20-95E4-7A25101AB895}"/>
+                  <a16:creationId xmlns:a16="http://schemas.microsoft.com/office/drawing/2014/main" xmlns="" id="{C05EB894-9410-4B20-95E4-7A25101AB895}"/>
                 </a:ext>
                 <a:ext uri="{C183D7F6-B498-43B3-948B-1728B52AA6E4}">
-                  <adec:decorative xmlns:adec="http://schemas.microsoft.com/office/drawing/2017/decorative" val="1"/>
+                  <adec:decorative xmlns:adec="http://schemas.microsoft.com/office/drawing/2017/decorative" xmlns="" val="1"/>
                 </a:ext>
               </a:extLst>
             </p:cNvPr>
@@ -10184,7 +10191,7 @@
             <p:nvPr>
               <p:extLst>
                 <p:ext uri="{386F3935-93C4-4BCD-93E2-E3B085C9AB24}">
-                  <p16:designElem xmlns:p16="http://schemas.microsoft.com/office/powerpoint/2015/main" val="1"/>
+                  <p16:designElem xmlns:p16="http://schemas.microsoft.com/office/powerpoint/2015/main" xmlns="" val="1"/>
                 </p:ext>
               </p:extLst>
             </p:nvPr>
@@ -10287,10 +10294,10 @@
             <p:cNvPr id="16" name="Rectangle 15">
               <a:extLst>
                 <a:ext uri="{FF2B5EF4-FFF2-40B4-BE49-F238E27FC236}">
-                  <a16:creationId xmlns:a16="http://schemas.microsoft.com/office/drawing/2014/main" id="{166E38B6-B050-4340-8E8F-3A971DADC031}"/>
+                  <a16:creationId xmlns:a16="http://schemas.microsoft.com/office/drawing/2014/main" xmlns="" id="{166E38B6-B050-4340-8E8F-3A971DADC031}"/>
                 </a:ext>
                 <a:ext uri="{C183D7F6-B498-43B3-948B-1728B52AA6E4}">
-                  <adec:decorative xmlns:adec="http://schemas.microsoft.com/office/drawing/2017/decorative" val="1"/>
+                  <adec:decorative xmlns:adec="http://schemas.microsoft.com/office/drawing/2017/decorative" xmlns="" val="1"/>
                 </a:ext>
               </a:extLst>
             </p:cNvPr>
@@ -10298,7 +10305,7 @@
             <p:nvPr>
               <p:extLst>
                 <p:ext uri="{386F3935-93C4-4BCD-93E2-E3B085C9AB24}">
-                  <p16:designElem xmlns:p16="http://schemas.microsoft.com/office/powerpoint/2015/main" val="1"/>
+                  <p16:designElem xmlns:p16="http://schemas.microsoft.com/office/powerpoint/2015/main" xmlns="" val="1"/>
                 </p:ext>
               </p:extLst>
             </p:nvPr>
@@ -10351,10 +10358,10 @@
           <p:cNvPr id="18" name="Rectangle 17">
             <a:extLst>
               <a:ext uri="{FF2B5EF4-FFF2-40B4-BE49-F238E27FC236}">
-                <a16:creationId xmlns:a16="http://schemas.microsoft.com/office/drawing/2014/main" id="{2E80C965-DB6D-4F81-9E9E-B027384D0BD6}"/>
+                <a16:creationId xmlns:a16="http://schemas.microsoft.com/office/drawing/2014/main" xmlns="" id="{2E80C965-DB6D-4F81-9E9E-B027384D0BD6}"/>
               </a:ext>
               <a:ext uri="{C183D7F6-B498-43B3-948B-1728B52AA6E4}">
-                <adec:decorative xmlns:adec="http://schemas.microsoft.com/office/drawing/2017/decorative" val="1"/>
+                <adec:decorative xmlns:adec="http://schemas.microsoft.com/office/drawing/2017/decorative" xmlns="" val="1"/>
               </a:ext>
             </a:extLst>
           </p:cNvPr>
@@ -10364,7 +10371,7 @@
           <p:nvPr>
             <p:extLst>
               <p:ext uri="{386F3935-93C4-4BCD-93E2-E3B085C9AB24}">
-                <p16:designElem xmlns:p16="http://schemas.microsoft.com/office/powerpoint/2015/main" val="1"/>
+                <p16:designElem xmlns:p16="http://schemas.microsoft.com/office/powerpoint/2015/main" xmlns="" val="1"/>
               </p:ext>
             </p:extLst>
           </p:nvPr>
@@ -10416,7 +10423,7 @@
           <p:cNvPr id="4" name="Date Placeholder 3">
             <a:extLst>
               <a:ext uri="{FF2B5EF4-FFF2-40B4-BE49-F238E27FC236}">
-                <a16:creationId xmlns:a16="http://schemas.microsoft.com/office/drawing/2014/main" id="{10100710-7B1C-E5F6-207B-04686EBBFF19}"/>
+                <a16:creationId xmlns:a16="http://schemas.microsoft.com/office/drawing/2014/main" xmlns="" id="{10100710-7B1C-E5F6-207B-04686EBBFF19}"/>
               </a:ext>
             </a:extLst>
           </p:cNvPr>
@@ -10453,7 +10460,7 @@
               </a:pPr>
               <a:t>6/22/2024</a:t>
             </a:fld>
-            <a:endParaRPr lang="en-NP"/>
+            <a:endParaRPr lang="x-none"/>
           </a:p>
         </p:txBody>
       </p:sp>
@@ -10462,10 +10469,10 @@
           <p:cNvPr id="20" name="Isosceles Triangle 19">
             <a:extLst>
               <a:ext uri="{FF2B5EF4-FFF2-40B4-BE49-F238E27FC236}">
-                <a16:creationId xmlns:a16="http://schemas.microsoft.com/office/drawing/2014/main" id="{633C5E46-DAC5-4661-9C87-22B08E2A512F}"/>
+                <a16:creationId xmlns:a16="http://schemas.microsoft.com/office/drawing/2014/main" xmlns="" id="{633C5E46-DAC5-4661-9C87-22B08E2A512F}"/>
               </a:ext>
               <a:ext uri="{C183D7F6-B498-43B3-948B-1728B52AA6E4}">
-                <adec:decorative xmlns:adec="http://schemas.microsoft.com/office/drawing/2017/decorative" val="1"/>
+                <adec:decorative xmlns:adec="http://schemas.microsoft.com/office/drawing/2017/decorative" xmlns="" val="1"/>
               </a:ext>
             </a:extLst>
           </p:cNvPr>
@@ -10475,7 +10482,7 @@
           <p:nvPr>
             <p:extLst>
               <p:ext uri="{386F3935-93C4-4BCD-93E2-E3B085C9AB24}">
-                <p16:designElem xmlns:p16="http://schemas.microsoft.com/office/powerpoint/2015/main" val="1"/>
+                <p16:designElem xmlns:p16="http://schemas.microsoft.com/office/powerpoint/2015/main" xmlns="" val="1"/>
               </p:ext>
             </p:extLst>
           </p:nvPr>
@@ -10524,15 +10531,88 @@
           </a:p>
         </p:txBody>
       </p:sp>
+      <p:sp>
+        <p:nvSpPr>
+          <p:cNvPr id="5" name="Footer Placeholder 4">
+            <a:extLst>
+              <a:ext uri="{FF2B5EF4-FFF2-40B4-BE49-F238E27FC236}">
+                <a16:creationId xmlns:a16="http://schemas.microsoft.com/office/drawing/2014/main" xmlns="" id="{FEB5C886-3AB3-CC8E-15AF-13510BE77EEF}"/>
+              </a:ext>
+            </a:extLst>
+          </p:cNvPr>
+          <p:cNvSpPr>
+            <a:spLocks noGrp="1"/>
+          </p:cNvSpPr>
+          <p:nvPr>
+            <p:ph type="ftr" sz="quarter" idx="11"/>
+          </p:nvPr>
+        </p:nvSpPr>
+        <p:spPr>
+          <a:xfrm>
+            <a:off x="4038600" y="6356350"/>
+            <a:ext cx="4114800" cy="365125"/>
+          </a:xfrm>
+        </p:spPr>
+        <p:txBody>
+          <a:bodyPr>
+            <a:normAutofit/>
+          </a:bodyPr>
+          <a:lstStyle/>
+          <a:p>
+            <a:endParaRPr lang="x-none"/>
+          </a:p>
+        </p:txBody>
+      </p:sp>
+      <p:sp>
+        <p:nvSpPr>
+          <p:cNvPr id="6" name="Slide Number Placeholder 5">
+            <a:extLst>
+              <a:ext uri="{FF2B5EF4-FFF2-40B4-BE49-F238E27FC236}">
+                <a16:creationId xmlns:a16="http://schemas.microsoft.com/office/drawing/2014/main" xmlns="" id="{25EED347-8993-E777-8E61-9348F5DCC18A}"/>
+              </a:ext>
+            </a:extLst>
+          </p:cNvPr>
+          <p:cNvSpPr>
+            <a:spLocks noGrp="1"/>
+          </p:cNvSpPr>
+          <p:nvPr>
+            <p:ph type="sldNum" sz="quarter" idx="12"/>
+          </p:nvPr>
+        </p:nvSpPr>
+        <p:spPr>
+          <a:xfrm>
+            <a:off x="8805333" y="6356350"/>
+            <a:ext cx="2743200" cy="365125"/>
+          </a:xfrm>
+        </p:spPr>
+        <p:txBody>
+          <a:bodyPr>
+            <a:normAutofit/>
+          </a:bodyPr>
+          <a:lstStyle/>
+          <a:p>
+            <a:pPr>
+              <a:spcAft>
+                <a:spcPts val="600"/>
+              </a:spcAft>
+            </a:pPr>
+            <a:fld id="{81FEE814-E9C2-BC4F-99F5-ABB679497227}" type="slidenum">
+              <a:rPr lang="x-none" smtClean="0"/>
+              <a:pPr>
+                <a:spcAft>
+                  <a:spcPts val="600"/>
+                </a:spcAft>
+              </a:pPr>
+              <a:t>8</a:t>
+            </a:fld>
+            <a:endParaRPr lang="x-none"/>
+          </a:p>
+        </p:txBody>
+      </p:sp>
       <p:pic>
         <p:nvPicPr>
-          <p:cNvPr id="7" name="demo1">
+          <p:cNvPr id="2" name="final demo">
             <a:hlinkClick r:id="" action="ppaction://media"/>
-            <a:extLst>
-              <a:ext uri="{FF2B5EF4-FFF2-40B4-BE49-F238E27FC236}">
-                <a16:creationId xmlns:a16="http://schemas.microsoft.com/office/drawing/2014/main" id="{72C0EB70-1D98-36A7-2C03-736FBB30E926}"/>
-              </a:ext>
-            </a:extLst>
           </p:cNvPr>
           <p:cNvPicPr>
             <a:picLocks noChangeAspect="1"/>
@@ -10554,95 +10634,14 @@
         </p:blipFill>
         <p:spPr>
           <a:xfrm>
-            <a:off x="884339" y="154637"/>
-            <a:ext cx="10394568" cy="6836271"/>
+            <a:off x="0" y="0"/>
+            <a:ext cx="12192000" cy="5934075"/>
           </a:xfrm>
           <a:prstGeom prst="rect">
             <a:avLst/>
           </a:prstGeom>
-          <a:ln>
-            <a:noFill/>
-          </a:ln>
         </p:spPr>
       </p:pic>
-      <p:sp>
-        <p:nvSpPr>
-          <p:cNvPr id="5" name="Footer Placeholder 4">
-            <a:extLst>
-              <a:ext uri="{FF2B5EF4-FFF2-40B4-BE49-F238E27FC236}">
-                <a16:creationId xmlns:a16="http://schemas.microsoft.com/office/drawing/2014/main" id="{FEB5C886-3AB3-CC8E-15AF-13510BE77EEF}"/>
-              </a:ext>
-            </a:extLst>
-          </p:cNvPr>
-          <p:cNvSpPr>
-            <a:spLocks noGrp="1"/>
-          </p:cNvSpPr>
-          <p:nvPr>
-            <p:ph type="ftr" sz="quarter" idx="11"/>
-          </p:nvPr>
-        </p:nvSpPr>
-        <p:spPr>
-          <a:xfrm>
-            <a:off x="4038600" y="6356350"/>
-            <a:ext cx="4114800" cy="365125"/>
-          </a:xfrm>
-        </p:spPr>
-        <p:txBody>
-          <a:bodyPr>
-            <a:normAutofit/>
-          </a:bodyPr>
-          <a:lstStyle/>
-          <a:p>
-            <a:endParaRPr lang="en-NP"/>
-          </a:p>
-        </p:txBody>
-      </p:sp>
-      <p:sp>
-        <p:nvSpPr>
-          <p:cNvPr id="6" name="Slide Number Placeholder 5">
-            <a:extLst>
-              <a:ext uri="{FF2B5EF4-FFF2-40B4-BE49-F238E27FC236}">
-                <a16:creationId xmlns:a16="http://schemas.microsoft.com/office/drawing/2014/main" id="{25EED347-8993-E777-8E61-9348F5DCC18A}"/>
-              </a:ext>
-            </a:extLst>
-          </p:cNvPr>
-          <p:cNvSpPr>
-            <a:spLocks noGrp="1"/>
-          </p:cNvSpPr>
-          <p:nvPr>
-            <p:ph type="sldNum" sz="quarter" idx="12"/>
-          </p:nvPr>
-        </p:nvSpPr>
-        <p:spPr>
-          <a:xfrm>
-            <a:off x="8805333" y="6356350"/>
-            <a:ext cx="2743200" cy="365125"/>
-          </a:xfrm>
-        </p:spPr>
-        <p:txBody>
-          <a:bodyPr>
-            <a:normAutofit/>
-          </a:bodyPr>
-          <a:lstStyle/>
-          <a:p>
-            <a:pPr>
-              <a:spcAft>
-                <a:spcPts val="600"/>
-              </a:spcAft>
-            </a:pPr>
-            <a:fld id="{81FEE814-E9C2-BC4F-99F5-ABB679497227}" type="slidenum">
-              <a:rPr lang="en-NP" smtClean="0"/>
-              <a:pPr>
-                <a:spcAft>
-                  <a:spcPts val="600"/>
-                </a:spcAft>
-              </a:pPr>
-              <a:t>8</a:t>
-            </a:fld>
-            <a:endParaRPr lang="en-NP"/>
-          </a:p>
-        </p:txBody>
-      </p:sp>
     </p:spTree>
     <p:extLst>
       <p:ext uri="{BB962C8B-B14F-4D97-AF65-F5344CB8AC3E}">
@@ -10654,7 +10653,7 @@
     <a:masterClrMapping/>
   </p:clrMapOvr>
   <mc:AlternateContent xmlns:mc="http://schemas.openxmlformats.org/markup-compatibility/2006">
-    <mc:Choice xmlns:p159="http://schemas.microsoft.com/office/powerpoint/2015/09/main" Requires="p159">
+    <mc:Choice xmlns:p159="http://schemas.microsoft.com/office/powerpoint/2015/09/main" xmlns="" Requires="p159">
       <p:transition xmlns:p14="http://schemas.microsoft.com/office/powerpoint/2010/main" spd="slow" p14:dur="2000">
         <p159:morph option="byObject"/>
       </p:transition>
@@ -10671,12 +10670,22 @@
         <p:cTn id="1" dur="indefinite" restart="never" nodeType="tmRoot">
           <p:childTnLst>
             <p:seq concurrent="1" nextAc="seek">
-              <p:cTn id="2" dur="indefinite" nodeType="mainSeq">
+              <p:cTn id="2" restart="whenNotActive" fill="hold" evtFilter="cancelBubble" nodeType="interactiveSeq">
+                <p:stCondLst>
+                  <p:cond evt="onClick" delay="0">
+                    <p:tgtEl>
+                      <p:spTgt spid="2"/>
+                    </p:tgtEl>
+                  </p:cond>
+                </p:stCondLst>
+                <p:endSync evt="end" delay="0">
+                  <p:rtn val="all"/>
+                </p:endSync>
                 <p:childTnLst>
                   <p:par>
                     <p:cTn id="3" fill="hold">
                       <p:stCondLst>
-                        <p:cond delay="indefinite"/>
+                        <p:cond delay="0"/>
                       </p:stCondLst>
                       <p:childTnLst>
                         <p:par>
@@ -10686,93 +10695,16 @@
                             </p:stCondLst>
                             <p:childTnLst>
                               <p:par>
-                                <p:cTn id="5" presetID="1" presetClass="mediacall" presetSubtype="0" fill="hold" nodeType="clickEffect">
-                                  <p:stCondLst>
-                                    <p:cond delay="0"/>
-                                  </p:stCondLst>
-                                  <p:childTnLst>
-                                    <p:cmd type="call" cmd="playFrom(0.0)">
-                                      <p:cBhvr>
-                                        <p:cTn id="6" dur="1" fill="hold"/>
-                                        <p:tgtEl>
-                                          <p:spTgt spid="7"/>
-                                        </p:tgtEl>
-                                      </p:cBhvr>
-                                    </p:cmd>
-                                  </p:childTnLst>
-                                </p:cTn>
-                              </p:par>
-                            </p:childTnLst>
-                          </p:cTn>
-                        </p:par>
-                      </p:childTnLst>
-                    </p:cTn>
-                  </p:par>
-                </p:childTnLst>
-              </p:cTn>
-              <p:prevCondLst>
-                <p:cond evt="onPrev" delay="0">
-                  <p:tgtEl>
-                    <p:sldTgt/>
-                  </p:tgtEl>
-                </p:cond>
-              </p:prevCondLst>
-              <p:nextCondLst>
-                <p:cond evt="onNext" delay="0">
-                  <p:tgtEl>
-                    <p:sldTgt/>
-                  </p:tgtEl>
-                </p:cond>
-              </p:nextCondLst>
-            </p:seq>
-            <p:video>
-              <p:cMediaNode>
-                <p:cTn id="7" fill="hold" display="0">
-                  <p:stCondLst>
-                    <p:cond delay="indefinite"/>
-                  </p:stCondLst>
-                </p:cTn>
-                <p:tgtEl>
-                  <p:spTgt spid="7"/>
-                </p:tgtEl>
-              </p:cMediaNode>
-            </p:video>
-            <p:seq concurrent="1" nextAc="seek">
-              <p:cTn id="8" restart="whenNotActive" fill="hold" evtFilter="cancelBubble" nodeType="interactiveSeq">
-                <p:stCondLst>
-                  <p:cond evt="onClick" delay="0">
-                    <p:tgtEl>
-                      <p:spTgt spid="7"/>
-                    </p:tgtEl>
-                  </p:cond>
-                </p:stCondLst>
-                <p:endSync evt="end" delay="0">
-                  <p:rtn val="all"/>
-                </p:endSync>
-                <p:childTnLst>
-                  <p:par>
-                    <p:cTn id="9" fill="hold">
-                      <p:stCondLst>
-                        <p:cond delay="0"/>
-                      </p:stCondLst>
-                      <p:childTnLst>
-                        <p:par>
-                          <p:cTn id="10" fill="hold">
-                            <p:stCondLst>
-                              <p:cond delay="0"/>
-                            </p:stCondLst>
-                            <p:childTnLst>
-                              <p:par>
-                                <p:cTn id="11" presetID="2" presetClass="mediacall" presetSubtype="0" fill="hold" nodeType="clickEffect">
+                                <p:cTn id="5" presetID="2" presetClass="mediacall" presetSubtype="0" fill="hold" nodeType="clickEffect">
                                   <p:stCondLst>
                                     <p:cond delay="0"/>
                                   </p:stCondLst>
                                   <p:childTnLst>
                                     <p:cmd type="call" cmd="togglePause">
                                       <p:cBhvr>
-                                        <p:cTn id="12" dur="1" fill="hold"/>
+                                        <p:cTn id="6" dur="1" fill="hold"/>
                                         <p:tgtEl>
-                                          <p:spTgt spid="7"/>
+                                          <p:spTgt spid="2"/>
                                         </p:tgtEl>
                                       </p:cBhvr>
                                     </p:cmd>
@@ -10790,11 +10722,23 @@
               <p:nextCondLst>
                 <p:cond evt="onClick" delay="0">
                   <p:tgtEl>
-                    <p:spTgt spid="7"/>
+                    <p:spTgt spid="2"/>
                   </p:tgtEl>
                 </p:cond>
               </p:nextCondLst>
             </p:seq>
+            <p:video>
+              <p:cMediaNode vol="80000">
+                <p:cTn id="7" fill="hold" display="0">
+                  <p:stCondLst>
+                    <p:cond delay="indefinite"/>
+                  </p:stCondLst>
+                </p:cTn>
+                <p:tgtEl>
+                  <p:spTgt spid="2"/>
+                </p:tgtEl>
+              </p:cMediaNode>
+            </p:video>
           </p:childTnLst>
         </p:cTn>
       </p:par>

</xml_diff>